<commit_message>
Schedule FIFO working perfectly
</commit_message>
<xml_diff>
--- a/Case 1/set_up_times/Set up times.pptx
+++ b/Case 1/set_up_times/Set up times.pptx
@@ -2,7 +2,7 @@
 <file path=ppt/presentation.xml><?xml version="1.0" encoding="utf-8"?>
 <p:presentation xmlns:a="http://schemas.openxmlformats.org/drawingml/2006/main" xmlns:r="http://schemas.openxmlformats.org/officeDocument/2006/relationships" xmlns:p="http://schemas.openxmlformats.org/presentationml/2006/main" saveSubsetFonts="1" autoCompressPictures="0">
   <p:sldMasterIdLst>
-    <p:sldMasterId id="2147483648" r:id="rId1"/>
+    <p:sldMasterId id="2147483660" r:id="rId1"/>
   </p:sldMasterIdLst>
   <p:sldIdLst>
     <p:sldId id="256" r:id="rId2"/>
@@ -11,13 +11,13 @@
     <p:sldId id="258" r:id="rId5"/>
     <p:sldId id="259" r:id="rId6"/>
   </p:sldIdLst>
-  <p:sldSz cx="12192000" cy="6858000"/>
+  <p:sldSz cx="3557588" cy="2671763"/>
   <p:notesSz cx="6858000" cy="9144000"/>
   <p:defaultTextStyle>
     <a:defPPr>
-      <a:defRPr lang="nl-BE"/>
+      <a:defRPr lang="en-US"/>
     </a:defPPr>
-    <a:lvl1pPr marL="0" algn="l" defTabSz="914400" rtl="0" eaLnBrk="1" latinLnBrk="0" hangingPunct="1">
+    <a:lvl1pPr marL="0" algn="l" defTabSz="457200" rtl="0" eaLnBrk="1" latinLnBrk="0" hangingPunct="1">
       <a:defRPr sz="1800" kern="1200">
         <a:solidFill>
           <a:schemeClr val="tx1"/>
@@ -27,7 +27,7 @@
         <a:cs typeface="+mn-cs"/>
       </a:defRPr>
     </a:lvl1pPr>
-    <a:lvl2pPr marL="457200" algn="l" defTabSz="914400" rtl="0" eaLnBrk="1" latinLnBrk="0" hangingPunct="1">
+    <a:lvl2pPr marL="457200" algn="l" defTabSz="457200" rtl="0" eaLnBrk="1" latinLnBrk="0" hangingPunct="1">
       <a:defRPr sz="1800" kern="1200">
         <a:solidFill>
           <a:schemeClr val="tx1"/>
@@ -37,7 +37,7 @@
         <a:cs typeface="+mn-cs"/>
       </a:defRPr>
     </a:lvl2pPr>
-    <a:lvl3pPr marL="914400" algn="l" defTabSz="914400" rtl="0" eaLnBrk="1" latinLnBrk="0" hangingPunct="1">
+    <a:lvl3pPr marL="914400" algn="l" defTabSz="457200" rtl="0" eaLnBrk="1" latinLnBrk="0" hangingPunct="1">
       <a:defRPr sz="1800" kern="1200">
         <a:solidFill>
           <a:schemeClr val="tx1"/>
@@ -47,7 +47,7 @@
         <a:cs typeface="+mn-cs"/>
       </a:defRPr>
     </a:lvl3pPr>
-    <a:lvl4pPr marL="1371600" algn="l" defTabSz="914400" rtl="0" eaLnBrk="1" latinLnBrk="0" hangingPunct="1">
+    <a:lvl4pPr marL="1371600" algn="l" defTabSz="457200" rtl="0" eaLnBrk="1" latinLnBrk="0" hangingPunct="1">
       <a:defRPr sz="1800" kern="1200">
         <a:solidFill>
           <a:schemeClr val="tx1"/>
@@ -57,7 +57,7 @@
         <a:cs typeface="+mn-cs"/>
       </a:defRPr>
     </a:lvl4pPr>
-    <a:lvl5pPr marL="1828800" algn="l" defTabSz="914400" rtl="0" eaLnBrk="1" latinLnBrk="0" hangingPunct="1">
+    <a:lvl5pPr marL="1828800" algn="l" defTabSz="457200" rtl="0" eaLnBrk="1" latinLnBrk="0" hangingPunct="1">
       <a:defRPr sz="1800" kern="1200">
         <a:solidFill>
           <a:schemeClr val="tx1"/>
@@ -67,7 +67,7 @@
         <a:cs typeface="+mn-cs"/>
       </a:defRPr>
     </a:lvl5pPr>
-    <a:lvl6pPr marL="2286000" algn="l" defTabSz="914400" rtl="0" eaLnBrk="1" latinLnBrk="0" hangingPunct="1">
+    <a:lvl6pPr marL="2286000" algn="l" defTabSz="457200" rtl="0" eaLnBrk="1" latinLnBrk="0" hangingPunct="1">
       <a:defRPr sz="1800" kern="1200">
         <a:solidFill>
           <a:schemeClr val="tx1"/>
@@ -77,7 +77,7 @@
         <a:cs typeface="+mn-cs"/>
       </a:defRPr>
     </a:lvl6pPr>
-    <a:lvl7pPr marL="2743200" algn="l" defTabSz="914400" rtl="0" eaLnBrk="1" latinLnBrk="0" hangingPunct="1">
+    <a:lvl7pPr marL="2743200" algn="l" defTabSz="457200" rtl="0" eaLnBrk="1" latinLnBrk="0" hangingPunct="1">
       <a:defRPr sz="1800" kern="1200">
         <a:solidFill>
           <a:schemeClr val="tx1"/>
@@ -87,7 +87,7 @@
         <a:cs typeface="+mn-cs"/>
       </a:defRPr>
     </a:lvl7pPr>
-    <a:lvl8pPr marL="3200400" algn="l" defTabSz="914400" rtl="0" eaLnBrk="1" latinLnBrk="0" hangingPunct="1">
+    <a:lvl8pPr marL="3200400" algn="l" defTabSz="457200" rtl="0" eaLnBrk="1" latinLnBrk="0" hangingPunct="1">
       <a:defRPr sz="1800" kern="1200">
         <a:solidFill>
           <a:schemeClr val="tx1"/>
@@ -97,7 +97,7 @@
         <a:cs typeface="+mn-cs"/>
       </a:defRPr>
     </a:lvl8pPr>
-    <a:lvl9pPr marL="3657600" algn="l" defTabSz="914400" rtl="0" eaLnBrk="1" latinLnBrk="0" hangingPunct="1">
+    <a:lvl9pPr marL="3657600" algn="l" defTabSz="457200" rtl="0" eaLnBrk="1" latinLnBrk="0" hangingPunct="1">
       <a:defRPr sz="1800" kern="1200">
         <a:solidFill>
           <a:schemeClr val="tx1"/>
@@ -108,6 +108,22 @@
       </a:defRPr>
     </a:lvl9pPr>
   </p:defaultTextStyle>
+  <p:extLst>
+    <p:ext uri="{EFAFB233-063F-42B5-8137-9DF3F51BA10A}">
+      <p15:sldGuideLst xmlns:p15="http://schemas.microsoft.com/office/powerpoint/2012/main">
+        <p15:guide id="1" orient="horz" pos="841" userDrawn="1">
+          <p15:clr>
+            <a:srgbClr val="A4A3A4"/>
+          </p15:clr>
+        </p15:guide>
+        <p15:guide id="2" pos="1120" userDrawn="1">
+          <p15:clr>
+            <a:srgbClr val="A4A3A4"/>
+          </p15:clr>
+        </p15:guide>
+      </p15:sldGuideLst>
+    </p:ext>
+  </p:extLst>
 </p:presentation>
 </file>
 
@@ -130,13 +146,7 @@
       </p:grpSpPr>
       <p:sp>
         <p:nvSpPr>
-          <p:cNvPr id="2" name="Titel 1">
-            <a:extLst>
-              <a:ext uri="{FF2B5EF4-FFF2-40B4-BE49-F238E27FC236}">
-                <a16:creationId xmlns:a16="http://schemas.microsoft.com/office/drawing/2014/main" id="{5451D081-FAEE-996D-5423-3A9E009D5E7B}"/>
-              </a:ext>
-            </a:extLst>
-          </p:cNvPr>
+          <p:cNvPr id="2" name="Title 1"/>
           <p:cNvSpPr>
             <a:spLocks noGrp="1"/>
           </p:cNvSpPr>
@@ -146,15 +156,15 @@
         </p:nvSpPr>
         <p:spPr>
           <a:xfrm>
-            <a:off x="1524000" y="1122363"/>
-            <a:ext cx="9144000" cy="2387600"/>
+            <a:off x="266819" y="437254"/>
+            <a:ext cx="3023950" cy="930169"/>
           </a:xfrm>
         </p:spPr>
         <p:txBody>
           <a:bodyPr anchor="b"/>
           <a:lstStyle>
             <a:lvl1pPr algn="ctr">
-              <a:defRPr sz="6000"/>
+              <a:defRPr sz="2335"/>
             </a:lvl1pPr>
           </a:lstStyle>
           <a:p>
@@ -162,19 +172,13 @@
               <a:rPr lang="nl-NL"/>
               <a:t>Klik om stijl te bewerken</a:t>
             </a:r>
-            <a:endParaRPr lang="en-US"/>
-          </a:p>
-        </p:txBody>
-      </p:sp>
-      <p:sp>
-        <p:nvSpPr>
-          <p:cNvPr id="3" name="Ondertitel 2">
-            <a:extLst>
-              <a:ext uri="{FF2B5EF4-FFF2-40B4-BE49-F238E27FC236}">
-                <a16:creationId xmlns:a16="http://schemas.microsoft.com/office/drawing/2014/main" id="{6F48526A-5E5E-6833-959A-EA50A70103CA}"/>
-              </a:ext>
-            </a:extLst>
-          </p:cNvPr>
+            <a:endParaRPr lang="en-US" dirty="0"/>
+          </a:p>
+        </p:txBody>
+      </p:sp>
+      <p:sp>
+        <p:nvSpPr>
+          <p:cNvPr id="3" name="Subtitle 2"/>
           <p:cNvSpPr>
             <a:spLocks noGrp="1"/>
           </p:cNvSpPr>
@@ -184,8 +188,8 @@
         </p:nvSpPr>
         <p:spPr>
           <a:xfrm>
-            <a:off x="1524000" y="3602038"/>
-            <a:ext cx="9144000" cy="1655762"/>
+            <a:off x="444699" y="1403294"/>
+            <a:ext cx="2668191" cy="645057"/>
           </a:xfrm>
         </p:spPr>
         <p:txBody>
@@ -193,39 +197,39 @@
           <a:lstStyle>
             <a:lvl1pPr marL="0" indent="0" algn="ctr">
               <a:buNone/>
-              <a:defRPr sz="2400"/>
+              <a:defRPr sz="934"/>
             </a:lvl1pPr>
-            <a:lvl2pPr marL="457200" indent="0" algn="ctr">
-              <a:buNone/>
-              <a:defRPr sz="2000"/>
+            <a:lvl2pPr marL="177897" indent="0" algn="ctr">
+              <a:buNone/>
+              <a:defRPr sz="778"/>
             </a:lvl2pPr>
-            <a:lvl3pPr marL="914400" indent="0" algn="ctr">
-              <a:buNone/>
-              <a:defRPr sz="1800"/>
+            <a:lvl3pPr marL="355793" indent="0" algn="ctr">
+              <a:buNone/>
+              <a:defRPr sz="700"/>
             </a:lvl3pPr>
-            <a:lvl4pPr marL="1371600" indent="0" algn="ctr">
-              <a:buNone/>
-              <a:defRPr sz="1600"/>
+            <a:lvl4pPr marL="533690" indent="0" algn="ctr">
+              <a:buNone/>
+              <a:defRPr sz="623"/>
             </a:lvl4pPr>
-            <a:lvl5pPr marL="1828800" indent="0" algn="ctr">
-              <a:buNone/>
-              <a:defRPr sz="1600"/>
+            <a:lvl5pPr marL="711586" indent="0" algn="ctr">
+              <a:buNone/>
+              <a:defRPr sz="623"/>
             </a:lvl5pPr>
-            <a:lvl6pPr marL="2286000" indent="0" algn="ctr">
-              <a:buNone/>
-              <a:defRPr sz="1600"/>
+            <a:lvl6pPr marL="889483" indent="0" algn="ctr">
+              <a:buNone/>
+              <a:defRPr sz="623"/>
             </a:lvl6pPr>
-            <a:lvl7pPr marL="2743200" indent="0" algn="ctr">
-              <a:buNone/>
-              <a:defRPr sz="1600"/>
+            <a:lvl7pPr marL="1067379" indent="0" algn="ctr">
+              <a:buNone/>
+              <a:defRPr sz="623"/>
             </a:lvl7pPr>
-            <a:lvl8pPr marL="3200400" indent="0" algn="ctr">
-              <a:buNone/>
-              <a:defRPr sz="1600"/>
+            <a:lvl8pPr marL="1245276" indent="0" algn="ctr">
+              <a:buNone/>
+              <a:defRPr sz="623"/>
             </a:lvl8pPr>
-            <a:lvl9pPr marL="3657600" indent="0" algn="ctr">
-              <a:buNone/>
-              <a:defRPr sz="1600"/>
+            <a:lvl9pPr marL="1423172" indent="0" algn="ctr">
+              <a:buNone/>
+              <a:defRPr sz="623"/>
             </a:lvl9pPr>
           </a:lstStyle>
           <a:p>
@@ -233,19 +237,13 @@
               <a:rPr lang="nl-NL"/>
               <a:t>Klikken om de ondertitelstijl van het model te bewerken</a:t>
             </a:r>
-            <a:endParaRPr lang="en-US"/>
-          </a:p>
-        </p:txBody>
-      </p:sp>
-      <p:sp>
-        <p:nvSpPr>
-          <p:cNvPr id="4" name="Tijdelijke aanduiding voor datum 3">
-            <a:extLst>
-              <a:ext uri="{FF2B5EF4-FFF2-40B4-BE49-F238E27FC236}">
-                <a16:creationId xmlns:a16="http://schemas.microsoft.com/office/drawing/2014/main" id="{0F150B2C-6911-A11B-B7E0-C5F39F44D7DC}"/>
-              </a:ext>
-            </a:extLst>
-          </p:cNvPr>
+            <a:endParaRPr lang="en-US" dirty="0"/>
+          </a:p>
+        </p:txBody>
+      </p:sp>
+      <p:sp>
+        <p:nvSpPr>
+          <p:cNvPr id="4" name="Date Placeholder 3"/>
           <p:cNvSpPr>
             <a:spLocks noGrp="1"/>
           </p:cNvSpPr>
@@ -268,13 +266,7 @@
       </p:sp>
       <p:sp>
         <p:nvSpPr>
-          <p:cNvPr id="5" name="Tijdelijke aanduiding voor voettekst 4">
-            <a:extLst>
-              <a:ext uri="{FF2B5EF4-FFF2-40B4-BE49-F238E27FC236}">
-                <a16:creationId xmlns:a16="http://schemas.microsoft.com/office/drawing/2014/main" id="{D6D397FF-98E1-3495-962A-FB0174D4F7BB}"/>
-              </a:ext>
-            </a:extLst>
-          </p:cNvPr>
+          <p:cNvPr id="5" name="Footer Placeholder 4"/>
           <p:cNvSpPr>
             <a:spLocks noGrp="1"/>
           </p:cNvSpPr>
@@ -293,13 +285,7 @@
       </p:sp>
       <p:sp>
         <p:nvSpPr>
-          <p:cNvPr id="6" name="Tijdelijke aanduiding voor dianummer 5">
-            <a:extLst>
-              <a:ext uri="{FF2B5EF4-FFF2-40B4-BE49-F238E27FC236}">
-                <a16:creationId xmlns:a16="http://schemas.microsoft.com/office/drawing/2014/main" id="{EF0B8AAA-7026-5321-2D20-1776B5FE5113}"/>
-              </a:ext>
-            </a:extLst>
-          </p:cNvPr>
+          <p:cNvPr id="6" name="Slide Number Placeholder 5"/>
           <p:cNvSpPr>
             <a:spLocks noGrp="1"/>
           </p:cNvSpPr>
@@ -323,7 +309,7 @@
     </p:spTree>
     <p:extLst>
       <p:ext uri="{BB962C8B-B14F-4D97-AF65-F5344CB8AC3E}">
-        <p14:creationId xmlns:p14="http://schemas.microsoft.com/office/powerpoint/2010/main" val="4130218211"/>
+        <p14:creationId xmlns:p14="http://schemas.microsoft.com/office/powerpoint/2010/main" val="114591704"/>
       </p:ext>
     </p:extLst>
   </p:cSld>
@@ -352,13 +338,7 @@
       </p:grpSpPr>
       <p:sp>
         <p:nvSpPr>
-          <p:cNvPr id="2" name="Titel 1">
-            <a:extLst>
-              <a:ext uri="{FF2B5EF4-FFF2-40B4-BE49-F238E27FC236}">
-                <a16:creationId xmlns:a16="http://schemas.microsoft.com/office/drawing/2014/main" id="{5A08DB86-99A2-D976-76FC-790930353717}"/>
-              </a:ext>
-            </a:extLst>
-          </p:cNvPr>
+          <p:cNvPr id="2" name="Title 1"/>
           <p:cNvSpPr>
             <a:spLocks noGrp="1"/>
           </p:cNvSpPr>
@@ -375,19 +355,13 @@
               <a:rPr lang="nl-NL"/>
               <a:t>Klik om stijl te bewerken</a:t>
             </a:r>
-            <a:endParaRPr lang="en-US"/>
-          </a:p>
-        </p:txBody>
-      </p:sp>
-      <p:sp>
-        <p:nvSpPr>
-          <p:cNvPr id="3" name="Tijdelijke aanduiding voor verticale tekst 2">
-            <a:extLst>
-              <a:ext uri="{FF2B5EF4-FFF2-40B4-BE49-F238E27FC236}">
-                <a16:creationId xmlns:a16="http://schemas.microsoft.com/office/drawing/2014/main" id="{20ADC58E-07B4-DF19-ED4B-ADCE0E237402}"/>
-              </a:ext>
-            </a:extLst>
-          </p:cNvPr>
+            <a:endParaRPr lang="en-US" dirty="0"/>
+          </a:p>
+        </p:txBody>
+      </p:sp>
+      <p:sp>
+        <p:nvSpPr>
+          <p:cNvPr id="3" name="Vertical Text Placeholder 2"/>
           <p:cNvSpPr>
             <a:spLocks noGrp="1"/>
           </p:cNvSpPr>
@@ -433,19 +407,13 @@
               <a:rPr lang="nl-NL"/>
               <a:t>Vijfde niveau</a:t>
             </a:r>
-            <a:endParaRPr lang="en-US"/>
-          </a:p>
-        </p:txBody>
-      </p:sp>
-      <p:sp>
-        <p:nvSpPr>
-          <p:cNvPr id="4" name="Tijdelijke aanduiding voor datum 3">
-            <a:extLst>
-              <a:ext uri="{FF2B5EF4-FFF2-40B4-BE49-F238E27FC236}">
-                <a16:creationId xmlns:a16="http://schemas.microsoft.com/office/drawing/2014/main" id="{2C4E2E7A-BDDD-C086-74E5-A1483651E4C5}"/>
-              </a:ext>
-            </a:extLst>
-          </p:cNvPr>
+            <a:endParaRPr lang="en-US" dirty="0"/>
+          </a:p>
+        </p:txBody>
+      </p:sp>
+      <p:sp>
+        <p:nvSpPr>
+          <p:cNvPr id="4" name="Date Placeholder 3"/>
           <p:cNvSpPr>
             <a:spLocks noGrp="1"/>
           </p:cNvSpPr>
@@ -468,13 +436,7 @@
       </p:sp>
       <p:sp>
         <p:nvSpPr>
-          <p:cNvPr id="5" name="Tijdelijke aanduiding voor voettekst 4">
-            <a:extLst>
-              <a:ext uri="{FF2B5EF4-FFF2-40B4-BE49-F238E27FC236}">
-                <a16:creationId xmlns:a16="http://schemas.microsoft.com/office/drawing/2014/main" id="{B2514084-38C3-3AA3-9A13-D16784D6DCC3}"/>
-              </a:ext>
-            </a:extLst>
-          </p:cNvPr>
+          <p:cNvPr id="5" name="Footer Placeholder 4"/>
           <p:cNvSpPr>
             <a:spLocks noGrp="1"/>
           </p:cNvSpPr>
@@ -493,13 +455,7 @@
       </p:sp>
       <p:sp>
         <p:nvSpPr>
-          <p:cNvPr id="6" name="Tijdelijke aanduiding voor dianummer 5">
-            <a:extLst>
-              <a:ext uri="{FF2B5EF4-FFF2-40B4-BE49-F238E27FC236}">
-                <a16:creationId xmlns:a16="http://schemas.microsoft.com/office/drawing/2014/main" id="{F3154584-5CE5-5006-7E0A-A59710C8923A}"/>
-              </a:ext>
-            </a:extLst>
-          </p:cNvPr>
+          <p:cNvPr id="6" name="Slide Number Placeholder 5"/>
           <p:cNvSpPr>
             <a:spLocks noGrp="1"/>
           </p:cNvSpPr>
@@ -523,7 +479,7 @@
     </p:spTree>
     <p:extLst>
       <p:ext uri="{BB962C8B-B14F-4D97-AF65-F5344CB8AC3E}">
-        <p14:creationId xmlns:p14="http://schemas.microsoft.com/office/powerpoint/2010/main" val="4249536020"/>
+        <p14:creationId xmlns:p14="http://schemas.microsoft.com/office/powerpoint/2010/main" val="3156551973"/>
       </p:ext>
     </p:extLst>
   </p:cSld>
@@ -552,13 +508,7 @@
       </p:grpSpPr>
       <p:sp>
         <p:nvSpPr>
-          <p:cNvPr id="2" name="Verticale titel 1">
-            <a:extLst>
-              <a:ext uri="{FF2B5EF4-FFF2-40B4-BE49-F238E27FC236}">
-                <a16:creationId xmlns:a16="http://schemas.microsoft.com/office/drawing/2014/main" id="{14F3C842-1272-D73F-7932-EEB318E14B45}"/>
-              </a:ext>
-            </a:extLst>
-          </p:cNvPr>
+          <p:cNvPr id="2" name="Vertical Title 1"/>
           <p:cNvSpPr>
             <a:spLocks noGrp="1"/>
           </p:cNvSpPr>
@@ -568,8 +518,8 @@
         </p:nvSpPr>
         <p:spPr>
           <a:xfrm>
-            <a:off x="8724900" y="365125"/>
-            <a:ext cx="2628900" cy="5811838"/>
+            <a:off x="2545899" y="142246"/>
+            <a:ext cx="767105" cy="2264196"/>
           </a:xfrm>
         </p:spPr>
         <p:txBody>
@@ -580,19 +530,13 @@
               <a:rPr lang="nl-NL"/>
               <a:t>Klik om stijl te bewerken</a:t>
             </a:r>
-            <a:endParaRPr lang="en-US"/>
-          </a:p>
-        </p:txBody>
-      </p:sp>
-      <p:sp>
-        <p:nvSpPr>
-          <p:cNvPr id="3" name="Tijdelijke aanduiding voor verticale tekst 2">
-            <a:extLst>
-              <a:ext uri="{FF2B5EF4-FFF2-40B4-BE49-F238E27FC236}">
-                <a16:creationId xmlns:a16="http://schemas.microsoft.com/office/drawing/2014/main" id="{D0623B49-98E4-239D-0C57-CA9864C17C2B}"/>
-              </a:ext>
-            </a:extLst>
-          </p:cNvPr>
+            <a:endParaRPr lang="en-US" dirty="0"/>
+          </a:p>
+        </p:txBody>
+      </p:sp>
+      <p:sp>
+        <p:nvSpPr>
+          <p:cNvPr id="3" name="Vertical Text Placeholder 2"/>
           <p:cNvSpPr>
             <a:spLocks noGrp="1"/>
           </p:cNvSpPr>
@@ -602,8 +546,8 @@
         </p:nvSpPr>
         <p:spPr>
           <a:xfrm>
-            <a:off x="838200" y="365125"/>
-            <a:ext cx="7734300" cy="5811838"/>
+            <a:off x="244584" y="142246"/>
+            <a:ext cx="2256845" cy="2264196"/>
           </a:xfrm>
         </p:spPr>
         <p:txBody>
@@ -643,19 +587,13 @@
               <a:rPr lang="nl-NL"/>
               <a:t>Vijfde niveau</a:t>
             </a:r>
-            <a:endParaRPr lang="en-US"/>
-          </a:p>
-        </p:txBody>
-      </p:sp>
-      <p:sp>
-        <p:nvSpPr>
-          <p:cNvPr id="4" name="Tijdelijke aanduiding voor datum 3">
-            <a:extLst>
-              <a:ext uri="{FF2B5EF4-FFF2-40B4-BE49-F238E27FC236}">
-                <a16:creationId xmlns:a16="http://schemas.microsoft.com/office/drawing/2014/main" id="{CB5E4166-5182-6AFD-CA86-2B50AFE647F6}"/>
-              </a:ext>
-            </a:extLst>
-          </p:cNvPr>
+            <a:endParaRPr lang="en-US" dirty="0"/>
+          </a:p>
+        </p:txBody>
+      </p:sp>
+      <p:sp>
+        <p:nvSpPr>
+          <p:cNvPr id="4" name="Date Placeholder 3"/>
           <p:cNvSpPr>
             <a:spLocks noGrp="1"/>
           </p:cNvSpPr>
@@ -678,13 +616,7 @@
       </p:sp>
       <p:sp>
         <p:nvSpPr>
-          <p:cNvPr id="5" name="Tijdelijke aanduiding voor voettekst 4">
-            <a:extLst>
-              <a:ext uri="{FF2B5EF4-FFF2-40B4-BE49-F238E27FC236}">
-                <a16:creationId xmlns:a16="http://schemas.microsoft.com/office/drawing/2014/main" id="{AEF88356-EA6B-963D-0A3F-00AB013CD19A}"/>
-              </a:ext>
-            </a:extLst>
-          </p:cNvPr>
+          <p:cNvPr id="5" name="Footer Placeholder 4"/>
           <p:cNvSpPr>
             <a:spLocks noGrp="1"/>
           </p:cNvSpPr>
@@ -703,13 +635,7 @@
       </p:sp>
       <p:sp>
         <p:nvSpPr>
-          <p:cNvPr id="6" name="Tijdelijke aanduiding voor dianummer 5">
-            <a:extLst>
-              <a:ext uri="{FF2B5EF4-FFF2-40B4-BE49-F238E27FC236}">
-                <a16:creationId xmlns:a16="http://schemas.microsoft.com/office/drawing/2014/main" id="{B5F3AC19-586E-7E5A-4E47-6FEBC898583C}"/>
-              </a:ext>
-            </a:extLst>
-          </p:cNvPr>
+          <p:cNvPr id="6" name="Slide Number Placeholder 5"/>
           <p:cNvSpPr>
             <a:spLocks noGrp="1"/>
           </p:cNvSpPr>
@@ -733,7 +659,7 @@
     </p:spTree>
     <p:extLst>
       <p:ext uri="{BB962C8B-B14F-4D97-AF65-F5344CB8AC3E}">
-        <p14:creationId xmlns:p14="http://schemas.microsoft.com/office/powerpoint/2010/main" val="214013830"/>
+        <p14:creationId xmlns:p14="http://schemas.microsoft.com/office/powerpoint/2010/main" val="114583227"/>
       </p:ext>
     </p:extLst>
   </p:cSld>
@@ -762,13 +688,7 @@
       </p:grpSpPr>
       <p:sp>
         <p:nvSpPr>
-          <p:cNvPr id="2" name="Titel 1">
-            <a:extLst>
-              <a:ext uri="{FF2B5EF4-FFF2-40B4-BE49-F238E27FC236}">
-                <a16:creationId xmlns:a16="http://schemas.microsoft.com/office/drawing/2014/main" id="{7D7662CC-BE89-B79E-039D-363D97D3B7E2}"/>
-              </a:ext>
-            </a:extLst>
-          </p:cNvPr>
+          <p:cNvPr id="2" name="Title 1"/>
           <p:cNvSpPr>
             <a:spLocks noGrp="1"/>
           </p:cNvSpPr>
@@ -785,19 +705,13 @@
               <a:rPr lang="nl-NL"/>
               <a:t>Klik om stijl te bewerken</a:t>
             </a:r>
-            <a:endParaRPr lang="en-US"/>
-          </a:p>
-        </p:txBody>
-      </p:sp>
-      <p:sp>
-        <p:nvSpPr>
-          <p:cNvPr id="3" name="Tijdelijke aanduiding voor inhoud 2">
-            <a:extLst>
-              <a:ext uri="{FF2B5EF4-FFF2-40B4-BE49-F238E27FC236}">
-                <a16:creationId xmlns:a16="http://schemas.microsoft.com/office/drawing/2014/main" id="{659D8A31-577B-8FA0-4B58-2221CDC4C9C4}"/>
-              </a:ext>
-            </a:extLst>
-          </p:cNvPr>
+            <a:endParaRPr lang="en-US" dirty="0"/>
+          </a:p>
+        </p:txBody>
+      </p:sp>
+      <p:sp>
+        <p:nvSpPr>
+          <p:cNvPr id="3" name="Content Placeholder 2"/>
           <p:cNvSpPr>
             <a:spLocks noGrp="1"/>
           </p:cNvSpPr>
@@ -843,19 +757,13 @@
               <a:rPr lang="nl-NL"/>
               <a:t>Vijfde niveau</a:t>
             </a:r>
-            <a:endParaRPr lang="en-US"/>
-          </a:p>
-        </p:txBody>
-      </p:sp>
-      <p:sp>
-        <p:nvSpPr>
-          <p:cNvPr id="4" name="Tijdelijke aanduiding voor datum 3">
-            <a:extLst>
-              <a:ext uri="{FF2B5EF4-FFF2-40B4-BE49-F238E27FC236}">
-                <a16:creationId xmlns:a16="http://schemas.microsoft.com/office/drawing/2014/main" id="{0CB69E26-427F-C0BD-8784-BE5299F7CE1F}"/>
-              </a:ext>
-            </a:extLst>
-          </p:cNvPr>
+            <a:endParaRPr lang="en-US" dirty="0"/>
+          </a:p>
+        </p:txBody>
+      </p:sp>
+      <p:sp>
+        <p:nvSpPr>
+          <p:cNvPr id="4" name="Date Placeholder 3"/>
           <p:cNvSpPr>
             <a:spLocks noGrp="1"/>
           </p:cNvSpPr>
@@ -878,13 +786,7 @@
       </p:sp>
       <p:sp>
         <p:nvSpPr>
-          <p:cNvPr id="5" name="Tijdelijke aanduiding voor voettekst 4">
-            <a:extLst>
-              <a:ext uri="{FF2B5EF4-FFF2-40B4-BE49-F238E27FC236}">
-                <a16:creationId xmlns:a16="http://schemas.microsoft.com/office/drawing/2014/main" id="{CCACA9FF-1BEC-8A8A-6DD6-CBA28424B441}"/>
-              </a:ext>
-            </a:extLst>
-          </p:cNvPr>
+          <p:cNvPr id="5" name="Footer Placeholder 4"/>
           <p:cNvSpPr>
             <a:spLocks noGrp="1"/>
           </p:cNvSpPr>
@@ -903,13 +805,7 @@
       </p:sp>
       <p:sp>
         <p:nvSpPr>
-          <p:cNvPr id="6" name="Tijdelijke aanduiding voor dianummer 5">
-            <a:extLst>
-              <a:ext uri="{FF2B5EF4-FFF2-40B4-BE49-F238E27FC236}">
-                <a16:creationId xmlns:a16="http://schemas.microsoft.com/office/drawing/2014/main" id="{3E84E874-F77B-DE36-C7D1-50C1F421BC85}"/>
-              </a:ext>
-            </a:extLst>
-          </p:cNvPr>
+          <p:cNvPr id="6" name="Slide Number Placeholder 5"/>
           <p:cNvSpPr>
             <a:spLocks noGrp="1"/>
           </p:cNvSpPr>
@@ -933,7 +829,7 @@
     </p:spTree>
     <p:extLst>
       <p:ext uri="{BB962C8B-B14F-4D97-AF65-F5344CB8AC3E}">
-        <p14:creationId xmlns:p14="http://schemas.microsoft.com/office/powerpoint/2010/main" val="1885259340"/>
+        <p14:creationId xmlns:p14="http://schemas.microsoft.com/office/powerpoint/2010/main" val="727461973"/>
       </p:ext>
     </p:extLst>
   </p:cSld>
@@ -962,13 +858,7 @@
       </p:grpSpPr>
       <p:sp>
         <p:nvSpPr>
-          <p:cNvPr id="2" name="Titel 1">
-            <a:extLst>
-              <a:ext uri="{FF2B5EF4-FFF2-40B4-BE49-F238E27FC236}">
-                <a16:creationId xmlns:a16="http://schemas.microsoft.com/office/drawing/2014/main" id="{8BB22F25-1FAB-AB0B-F140-2A91CDDE9DC5}"/>
-              </a:ext>
-            </a:extLst>
-          </p:cNvPr>
+          <p:cNvPr id="2" name="Title 1"/>
           <p:cNvSpPr>
             <a:spLocks noGrp="1"/>
           </p:cNvSpPr>
@@ -978,15 +868,15 @@
         </p:nvSpPr>
         <p:spPr>
           <a:xfrm>
-            <a:off x="831850" y="1709738"/>
-            <a:ext cx="10515600" cy="2852737"/>
+            <a:off x="242731" y="666086"/>
+            <a:ext cx="3068420" cy="1111379"/>
           </a:xfrm>
         </p:spPr>
         <p:txBody>
           <a:bodyPr anchor="b"/>
           <a:lstStyle>
             <a:lvl1pPr>
-              <a:defRPr sz="6000"/>
+              <a:defRPr sz="2335"/>
             </a:lvl1pPr>
           </a:lstStyle>
           <a:p>
@@ -994,19 +884,13 @@
               <a:rPr lang="nl-NL"/>
               <a:t>Klik om stijl te bewerken</a:t>
             </a:r>
-            <a:endParaRPr lang="en-US"/>
-          </a:p>
-        </p:txBody>
-      </p:sp>
-      <p:sp>
-        <p:nvSpPr>
-          <p:cNvPr id="3" name="Tijdelijke aanduiding voor tekst 2">
-            <a:extLst>
-              <a:ext uri="{FF2B5EF4-FFF2-40B4-BE49-F238E27FC236}">
-                <a16:creationId xmlns:a16="http://schemas.microsoft.com/office/drawing/2014/main" id="{C603D73C-04BD-F703-9D35-6CAE7E0ADBB0}"/>
-              </a:ext>
-            </a:extLst>
-          </p:cNvPr>
+            <a:endParaRPr lang="en-US" dirty="0"/>
+          </a:p>
+        </p:txBody>
+      </p:sp>
+      <p:sp>
+        <p:nvSpPr>
+          <p:cNvPr id="3" name="Text Placeholder 2"/>
           <p:cNvSpPr>
             <a:spLocks noGrp="1"/>
           </p:cNvSpPr>
@@ -1016,8 +900,8 @@
         </p:nvSpPr>
         <p:spPr>
           <a:xfrm>
-            <a:off x="831850" y="4589463"/>
-            <a:ext cx="10515600" cy="1500187"/>
+            <a:off x="242731" y="1787979"/>
+            <a:ext cx="3068420" cy="584448"/>
           </a:xfrm>
         </p:spPr>
         <p:txBody>
@@ -1025,17 +909,15 @@
           <a:lstStyle>
             <a:lvl1pPr marL="0" indent="0">
               <a:buNone/>
-              <a:defRPr sz="2400">
+              <a:defRPr sz="934">
                 <a:solidFill>
-                  <a:schemeClr val="tx1">
-                    <a:tint val="75000"/>
-                  </a:schemeClr>
+                  <a:schemeClr val="tx1"/>
                 </a:solidFill>
               </a:defRPr>
             </a:lvl1pPr>
-            <a:lvl2pPr marL="457200" indent="0">
-              <a:buNone/>
-              <a:defRPr sz="2000">
+            <a:lvl2pPr marL="177897" indent="0">
+              <a:buNone/>
+              <a:defRPr sz="778">
                 <a:solidFill>
                   <a:schemeClr val="tx1">
                     <a:tint val="75000"/>
@@ -1043,9 +925,9 @@
                 </a:solidFill>
               </a:defRPr>
             </a:lvl2pPr>
-            <a:lvl3pPr marL="914400" indent="0">
-              <a:buNone/>
-              <a:defRPr sz="1800">
+            <a:lvl3pPr marL="355793" indent="0">
+              <a:buNone/>
+              <a:defRPr sz="700">
                 <a:solidFill>
                   <a:schemeClr val="tx1">
                     <a:tint val="75000"/>
@@ -1053,9 +935,9 @@
                 </a:solidFill>
               </a:defRPr>
             </a:lvl3pPr>
-            <a:lvl4pPr marL="1371600" indent="0">
-              <a:buNone/>
-              <a:defRPr sz="1600">
+            <a:lvl4pPr marL="533690" indent="0">
+              <a:buNone/>
+              <a:defRPr sz="623">
                 <a:solidFill>
                   <a:schemeClr val="tx1">
                     <a:tint val="75000"/>
@@ -1063,9 +945,9 @@
                 </a:solidFill>
               </a:defRPr>
             </a:lvl4pPr>
-            <a:lvl5pPr marL="1828800" indent="0">
-              <a:buNone/>
-              <a:defRPr sz="1600">
+            <a:lvl5pPr marL="711586" indent="0">
+              <a:buNone/>
+              <a:defRPr sz="623">
                 <a:solidFill>
                   <a:schemeClr val="tx1">
                     <a:tint val="75000"/>
@@ -1073,9 +955,9 @@
                 </a:solidFill>
               </a:defRPr>
             </a:lvl5pPr>
-            <a:lvl6pPr marL="2286000" indent="0">
-              <a:buNone/>
-              <a:defRPr sz="1600">
+            <a:lvl6pPr marL="889483" indent="0">
+              <a:buNone/>
+              <a:defRPr sz="623">
                 <a:solidFill>
                   <a:schemeClr val="tx1">
                     <a:tint val="75000"/>
@@ -1083,9 +965,9 @@
                 </a:solidFill>
               </a:defRPr>
             </a:lvl6pPr>
-            <a:lvl7pPr marL="2743200" indent="0">
-              <a:buNone/>
-              <a:defRPr sz="1600">
+            <a:lvl7pPr marL="1067379" indent="0">
+              <a:buNone/>
+              <a:defRPr sz="623">
                 <a:solidFill>
                   <a:schemeClr val="tx1">
                     <a:tint val="75000"/>
@@ -1093,9 +975,9 @@
                 </a:solidFill>
               </a:defRPr>
             </a:lvl7pPr>
-            <a:lvl8pPr marL="3200400" indent="0">
-              <a:buNone/>
-              <a:defRPr sz="1600">
+            <a:lvl8pPr marL="1245276" indent="0">
+              <a:buNone/>
+              <a:defRPr sz="623">
                 <a:solidFill>
                   <a:schemeClr val="tx1">
                     <a:tint val="75000"/>
@@ -1103,9 +985,9 @@
                 </a:solidFill>
               </a:defRPr>
             </a:lvl8pPr>
-            <a:lvl9pPr marL="3657600" indent="0">
-              <a:buNone/>
-              <a:defRPr sz="1600">
+            <a:lvl9pPr marL="1423172" indent="0">
+              <a:buNone/>
+              <a:defRPr sz="623">
                 <a:solidFill>
                   <a:schemeClr val="tx1">
                     <a:tint val="75000"/>
@@ -1125,13 +1007,7 @@
       </p:sp>
       <p:sp>
         <p:nvSpPr>
-          <p:cNvPr id="4" name="Tijdelijke aanduiding voor datum 3">
-            <a:extLst>
-              <a:ext uri="{FF2B5EF4-FFF2-40B4-BE49-F238E27FC236}">
-                <a16:creationId xmlns:a16="http://schemas.microsoft.com/office/drawing/2014/main" id="{E77C99B6-BD41-DFDA-73EA-A914AE956D1E}"/>
-              </a:ext>
-            </a:extLst>
-          </p:cNvPr>
+          <p:cNvPr id="4" name="Date Placeholder 3"/>
           <p:cNvSpPr>
             <a:spLocks noGrp="1"/>
           </p:cNvSpPr>
@@ -1154,13 +1030,7 @@
       </p:sp>
       <p:sp>
         <p:nvSpPr>
-          <p:cNvPr id="5" name="Tijdelijke aanduiding voor voettekst 4">
-            <a:extLst>
-              <a:ext uri="{FF2B5EF4-FFF2-40B4-BE49-F238E27FC236}">
-                <a16:creationId xmlns:a16="http://schemas.microsoft.com/office/drawing/2014/main" id="{CE6C44AC-DCEE-9E5B-9338-1F43DC3AC1A8}"/>
-              </a:ext>
-            </a:extLst>
-          </p:cNvPr>
+          <p:cNvPr id="5" name="Footer Placeholder 4"/>
           <p:cNvSpPr>
             <a:spLocks noGrp="1"/>
           </p:cNvSpPr>
@@ -1179,13 +1049,7 @@
       </p:sp>
       <p:sp>
         <p:nvSpPr>
-          <p:cNvPr id="6" name="Tijdelijke aanduiding voor dianummer 5">
-            <a:extLst>
-              <a:ext uri="{FF2B5EF4-FFF2-40B4-BE49-F238E27FC236}">
-                <a16:creationId xmlns:a16="http://schemas.microsoft.com/office/drawing/2014/main" id="{6B793707-929B-A624-28BC-BF6EA7E46D9E}"/>
-              </a:ext>
-            </a:extLst>
-          </p:cNvPr>
+          <p:cNvPr id="6" name="Slide Number Placeholder 5"/>
           <p:cNvSpPr>
             <a:spLocks noGrp="1"/>
           </p:cNvSpPr>
@@ -1209,7 +1073,7 @@
     </p:spTree>
     <p:extLst>
       <p:ext uri="{BB962C8B-B14F-4D97-AF65-F5344CB8AC3E}">
-        <p14:creationId xmlns:p14="http://schemas.microsoft.com/office/powerpoint/2010/main" val="3418163315"/>
+        <p14:creationId xmlns:p14="http://schemas.microsoft.com/office/powerpoint/2010/main" val="3325178634"/>
       </p:ext>
     </p:extLst>
   </p:cSld>
@@ -1238,13 +1102,7 @@
       </p:grpSpPr>
       <p:sp>
         <p:nvSpPr>
-          <p:cNvPr id="2" name="Titel 1">
-            <a:extLst>
-              <a:ext uri="{FF2B5EF4-FFF2-40B4-BE49-F238E27FC236}">
-                <a16:creationId xmlns:a16="http://schemas.microsoft.com/office/drawing/2014/main" id="{2BF34A02-4462-7B47-5099-345C4D69D994}"/>
-              </a:ext>
-            </a:extLst>
-          </p:cNvPr>
+          <p:cNvPr id="2" name="Title 1"/>
           <p:cNvSpPr>
             <a:spLocks noGrp="1"/>
           </p:cNvSpPr>
@@ -1261,19 +1119,13 @@
               <a:rPr lang="nl-NL"/>
               <a:t>Klik om stijl te bewerken</a:t>
             </a:r>
-            <a:endParaRPr lang="en-US"/>
-          </a:p>
-        </p:txBody>
-      </p:sp>
-      <p:sp>
-        <p:nvSpPr>
-          <p:cNvPr id="3" name="Tijdelijke aanduiding voor inhoud 2">
-            <a:extLst>
-              <a:ext uri="{FF2B5EF4-FFF2-40B4-BE49-F238E27FC236}">
-                <a16:creationId xmlns:a16="http://schemas.microsoft.com/office/drawing/2014/main" id="{D995132A-5591-9352-92D7-D057680DBEE2}"/>
-              </a:ext>
-            </a:extLst>
-          </p:cNvPr>
+            <a:endParaRPr lang="en-US" dirty="0"/>
+          </a:p>
+        </p:txBody>
+      </p:sp>
+      <p:sp>
+        <p:nvSpPr>
+          <p:cNvPr id="3" name="Content Placeholder 2"/>
           <p:cNvSpPr>
             <a:spLocks noGrp="1"/>
           </p:cNvSpPr>
@@ -1283,8 +1135,8 @@
         </p:nvSpPr>
         <p:spPr>
           <a:xfrm>
-            <a:off x="838200" y="1825625"/>
-            <a:ext cx="5181600" cy="4351338"/>
+            <a:off x="244584" y="711233"/>
+            <a:ext cx="1511975" cy="1695209"/>
           </a:xfrm>
         </p:spPr>
         <p:txBody>
@@ -1324,19 +1176,13 @@
               <a:rPr lang="nl-NL"/>
               <a:t>Vijfde niveau</a:t>
             </a:r>
-            <a:endParaRPr lang="en-US"/>
-          </a:p>
-        </p:txBody>
-      </p:sp>
-      <p:sp>
-        <p:nvSpPr>
-          <p:cNvPr id="4" name="Tijdelijke aanduiding voor inhoud 3">
-            <a:extLst>
-              <a:ext uri="{FF2B5EF4-FFF2-40B4-BE49-F238E27FC236}">
-                <a16:creationId xmlns:a16="http://schemas.microsoft.com/office/drawing/2014/main" id="{DA94ED78-A1AB-BBDB-AB24-59EF462285FF}"/>
-              </a:ext>
-            </a:extLst>
-          </p:cNvPr>
+            <a:endParaRPr lang="en-US" dirty="0"/>
+          </a:p>
+        </p:txBody>
+      </p:sp>
+      <p:sp>
+        <p:nvSpPr>
+          <p:cNvPr id="4" name="Content Placeholder 3"/>
           <p:cNvSpPr>
             <a:spLocks noGrp="1"/>
           </p:cNvSpPr>
@@ -1346,8 +1192,8 @@
         </p:nvSpPr>
         <p:spPr>
           <a:xfrm>
-            <a:off x="6172200" y="1825625"/>
-            <a:ext cx="5181600" cy="4351338"/>
+            <a:off x="1801029" y="711233"/>
+            <a:ext cx="1511975" cy="1695209"/>
           </a:xfrm>
         </p:spPr>
         <p:txBody>
@@ -1387,19 +1233,13 @@
               <a:rPr lang="nl-NL"/>
               <a:t>Vijfde niveau</a:t>
             </a:r>
-            <a:endParaRPr lang="en-US"/>
-          </a:p>
-        </p:txBody>
-      </p:sp>
-      <p:sp>
-        <p:nvSpPr>
-          <p:cNvPr id="5" name="Tijdelijke aanduiding voor datum 4">
-            <a:extLst>
-              <a:ext uri="{FF2B5EF4-FFF2-40B4-BE49-F238E27FC236}">
-                <a16:creationId xmlns:a16="http://schemas.microsoft.com/office/drawing/2014/main" id="{60BA4BDD-525C-6FF9-9EA4-5421B5DD5E1C}"/>
-              </a:ext>
-            </a:extLst>
-          </p:cNvPr>
+            <a:endParaRPr lang="en-US" dirty="0"/>
+          </a:p>
+        </p:txBody>
+      </p:sp>
+      <p:sp>
+        <p:nvSpPr>
+          <p:cNvPr id="5" name="Date Placeholder 4"/>
           <p:cNvSpPr>
             <a:spLocks noGrp="1"/>
           </p:cNvSpPr>
@@ -1422,13 +1262,7 @@
       </p:sp>
       <p:sp>
         <p:nvSpPr>
-          <p:cNvPr id="6" name="Tijdelijke aanduiding voor voettekst 5">
-            <a:extLst>
-              <a:ext uri="{FF2B5EF4-FFF2-40B4-BE49-F238E27FC236}">
-                <a16:creationId xmlns:a16="http://schemas.microsoft.com/office/drawing/2014/main" id="{E882C1EB-11FF-21A0-2F80-3456D6E87A9A}"/>
-              </a:ext>
-            </a:extLst>
-          </p:cNvPr>
+          <p:cNvPr id="6" name="Footer Placeholder 5"/>
           <p:cNvSpPr>
             <a:spLocks noGrp="1"/>
           </p:cNvSpPr>
@@ -1447,13 +1281,7 @@
       </p:sp>
       <p:sp>
         <p:nvSpPr>
-          <p:cNvPr id="7" name="Tijdelijke aanduiding voor dianummer 6">
-            <a:extLst>
-              <a:ext uri="{FF2B5EF4-FFF2-40B4-BE49-F238E27FC236}">
-                <a16:creationId xmlns:a16="http://schemas.microsoft.com/office/drawing/2014/main" id="{BF94E9AD-967C-28B4-B3DB-B4B61025C8FE}"/>
-              </a:ext>
-            </a:extLst>
-          </p:cNvPr>
+          <p:cNvPr id="7" name="Slide Number Placeholder 6"/>
           <p:cNvSpPr>
             <a:spLocks noGrp="1"/>
           </p:cNvSpPr>
@@ -1477,7 +1305,7 @@
     </p:spTree>
     <p:extLst>
       <p:ext uri="{BB962C8B-B14F-4D97-AF65-F5344CB8AC3E}">
-        <p14:creationId xmlns:p14="http://schemas.microsoft.com/office/powerpoint/2010/main" val="243557338"/>
+        <p14:creationId xmlns:p14="http://schemas.microsoft.com/office/powerpoint/2010/main" val="671258441"/>
       </p:ext>
     </p:extLst>
   </p:cSld>
@@ -1506,13 +1334,7 @@
       </p:grpSpPr>
       <p:sp>
         <p:nvSpPr>
-          <p:cNvPr id="2" name="Titel 1">
-            <a:extLst>
-              <a:ext uri="{FF2B5EF4-FFF2-40B4-BE49-F238E27FC236}">
-                <a16:creationId xmlns:a16="http://schemas.microsoft.com/office/drawing/2014/main" id="{8A228779-25FD-C86A-3949-6F601562004D}"/>
-              </a:ext>
-            </a:extLst>
-          </p:cNvPr>
+          <p:cNvPr id="2" name="Title 1"/>
           <p:cNvSpPr>
             <a:spLocks noGrp="1"/>
           </p:cNvSpPr>
@@ -1522,8 +1344,8 @@
         </p:nvSpPr>
         <p:spPr>
           <a:xfrm>
-            <a:off x="839788" y="365125"/>
-            <a:ext cx="10515600" cy="1325563"/>
+            <a:off x="245047" y="142247"/>
+            <a:ext cx="3068420" cy="516417"/>
           </a:xfrm>
         </p:spPr>
         <p:txBody>
@@ -1534,19 +1356,13 @@
               <a:rPr lang="nl-NL"/>
               <a:t>Klik om stijl te bewerken</a:t>
             </a:r>
-            <a:endParaRPr lang="en-US"/>
-          </a:p>
-        </p:txBody>
-      </p:sp>
-      <p:sp>
-        <p:nvSpPr>
-          <p:cNvPr id="3" name="Tijdelijke aanduiding voor tekst 2">
-            <a:extLst>
-              <a:ext uri="{FF2B5EF4-FFF2-40B4-BE49-F238E27FC236}">
-                <a16:creationId xmlns:a16="http://schemas.microsoft.com/office/drawing/2014/main" id="{89C27D02-298D-6DB5-DA98-3F3897D887BC}"/>
-              </a:ext>
-            </a:extLst>
-          </p:cNvPr>
+            <a:endParaRPr lang="en-US" dirty="0"/>
+          </a:p>
+        </p:txBody>
+      </p:sp>
+      <p:sp>
+        <p:nvSpPr>
+          <p:cNvPr id="3" name="Text Placeholder 2"/>
           <p:cNvSpPr>
             <a:spLocks noGrp="1"/>
           </p:cNvSpPr>
@@ -1556,8 +1372,8 @@
         </p:nvSpPr>
         <p:spPr>
           <a:xfrm>
-            <a:off x="839788" y="1681163"/>
-            <a:ext cx="5157787" cy="823912"/>
+            <a:off x="245048" y="654953"/>
+            <a:ext cx="1505026" cy="320982"/>
           </a:xfrm>
         </p:spPr>
         <p:txBody>
@@ -1565,39 +1381,39 @@
           <a:lstStyle>
             <a:lvl1pPr marL="0" indent="0">
               <a:buNone/>
-              <a:defRPr sz="2400" b="1"/>
+              <a:defRPr sz="934" b="1"/>
             </a:lvl1pPr>
-            <a:lvl2pPr marL="457200" indent="0">
-              <a:buNone/>
-              <a:defRPr sz="2000" b="1"/>
+            <a:lvl2pPr marL="177897" indent="0">
+              <a:buNone/>
+              <a:defRPr sz="778" b="1"/>
             </a:lvl2pPr>
-            <a:lvl3pPr marL="914400" indent="0">
-              <a:buNone/>
-              <a:defRPr sz="1800" b="1"/>
+            <a:lvl3pPr marL="355793" indent="0">
+              <a:buNone/>
+              <a:defRPr sz="700" b="1"/>
             </a:lvl3pPr>
-            <a:lvl4pPr marL="1371600" indent="0">
-              <a:buNone/>
-              <a:defRPr sz="1600" b="1"/>
+            <a:lvl4pPr marL="533690" indent="0">
+              <a:buNone/>
+              <a:defRPr sz="623" b="1"/>
             </a:lvl4pPr>
-            <a:lvl5pPr marL="1828800" indent="0">
-              <a:buNone/>
-              <a:defRPr sz="1600" b="1"/>
+            <a:lvl5pPr marL="711586" indent="0">
+              <a:buNone/>
+              <a:defRPr sz="623" b="1"/>
             </a:lvl5pPr>
-            <a:lvl6pPr marL="2286000" indent="0">
-              <a:buNone/>
-              <a:defRPr sz="1600" b="1"/>
+            <a:lvl6pPr marL="889483" indent="0">
+              <a:buNone/>
+              <a:defRPr sz="623" b="1"/>
             </a:lvl6pPr>
-            <a:lvl7pPr marL="2743200" indent="0">
-              <a:buNone/>
-              <a:defRPr sz="1600" b="1"/>
+            <a:lvl7pPr marL="1067379" indent="0">
+              <a:buNone/>
+              <a:defRPr sz="623" b="1"/>
             </a:lvl7pPr>
-            <a:lvl8pPr marL="3200400" indent="0">
-              <a:buNone/>
-              <a:defRPr sz="1600" b="1"/>
+            <a:lvl8pPr marL="1245276" indent="0">
+              <a:buNone/>
+              <a:defRPr sz="623" b="1"/>
             </a:lvl8pPr>
-            <a:lvl9pPr marL="3657600" indent="0">
-              <a:buNone/>
-              <a:defRPr sz="1600" b="1"/>
+            <a:lvl9pPr marL="1423172" indent="0">
+              <a:buNone/>
+              <a:defRPr sz="623" b="1"/>
             </a:lvl9pPr>
           </a:lstStyle>
           <a:p>
@@ -1611,13 +1427,7 @@
       </p:sp>
       <p:sp>
         <p:nvSpPr>
-          <p:cNvPr id="4" name="Tijdelijke aanduiding voor inhoud 3">
-            <a:extLst>
-              <a:ext uri="{FF2B5EF4-FFF2-40B4-BE49-F238E27FC236}">
-                <a16:creationId xmlns:a16="http://schemas.microsoft.com/office/drawing/2014/main" id="{8C2CEFC4-50FB-7E41-EB70-76B14C2031EF}"/>
-              </a:ext>
-            </a:extLst>
-          </p:cNvPr>
+          <p:cNvPr id="4" name="Content Placeholder 3"/>
           <p:cNvSpPr>
             <a:spLocks noGrp="1"/>
           </p:cNvSpPr>
@@ -1627,8 +1437,8 @@
         </p:nvSpPr>
         <p:spPr>
           <a:xfrm>
-            <a:off x="839788" y="2505075"/>
-            <a:ext cx="5157787" cy="3684588"/>
+            <a:off x="245048" y="975936"/>
+            <a:ext cx="1505026" cy="1435454"/>
           </a:xfrm>
         </p:spPr>
         <p:txBody>
@@ -1668,19 +1478,13 @@
               <a:rPr lang="nl-NL"/>
               <a:t>Vijfde niveau</a:t>
             </a:r>
-            <a:endParaRPr lang="en-US"/>
-          </a:p>
-        </p:txBody>
-      </p:sp>
-      <p:sp>
-        <p:nvSpPr>
-          <p:cNvPr id="5" name="Tijdelijke aanduiding voor tekst 4">
-            <a:extLst>
-              <a:ext uri="{FF2B5EF4-FFF2-40B4-BE49-F238E27FC236}">
-                <a16:creationId xmlns:a16="http://schemas.microsoft.com/office/drawing/2014/main" id="{7EC0BF3B-75DE-B447-5F65-A1C44F6DEEFE}"/>
-              </a:ext>
-            </a:extLst>
-          </p:cNvPr>
+            <a:endParaRPr lang="en-US" dirty="0"/>
+          </a:p>
+        </p:txBody>
+      </p:sp>
+      <p:sp>
+        <p:nvSpPr>
+          <p:cNvPr id="5" name="Text Placeholder 4"/>
           <p:cNvSpPr>
             <a:spLocks noGrp="1"/>
           </p:cNvSpPr>
@@ -1690,8 +1494,8 @@
         </p:nvSpPr>
         <p:spPr>
           <a:xfrm>
-            <a:off x="6172200" y="1681163"/>
-            <a:ext cx="5183188" cy="823912"/>
+            <a:off x="1801029" y="654953"/>
+            <a:ext cx="1512438" cy="320982"/>
           </a:xfrm>
         </p:spPr>
         <p:txBody>
@@ -1699,39 +1503,39 @@
           <a:lstStyle>
             <a:lvl1pPr marL="0" indent="0">
               <a:buNone/>
-              <a:defRPr sz="2400" b="1"/>
+              <a:defRPr sz="934" b="1"/>
             </a:lvl1pPr>
-            <a:lvl2pPr marL="457200" indent="0">
-              <a:buNone/>
-              <a:defRPr sz="2000" b="1"/>
+            <a:lvl2pPr marL="177897" indent="0">
+              <a:buNone/>
+              <a:defRPr sz="778" b="1"/>
             </a:lvl2pPr>
-            <a:lvl3pPr marL="914400" indent="0">
-              <a:buNone/>
-              <a:defRPr sz="1800" b="1"/>
+            <a:lvl3pPr marL="355793" indent="0">
+              <a:buNone/>
+              <a:defRPr sz="700" b="1"/>
             </a:lvl3pPr>
-            <a:lvl4pPr marL="1371600" indent="0">
-              <a:buNone/>
-              <a:defRPr sz="1600" b="1"/>
+            <a:lvl4pPr marL="533690" indent="0">
+              <a:buNone/>
+              <a:defRPr sz="623" b="1"/>
             </a:lvl4pPr>
-            <a:lvl5pPr marL="1828800" indent="0">
-              <a:buNone/>
-              <a:defRPr sz="1600" b="1"/>
+            <a:lvl5pPr marL="711586" indent="0">
+              <a:buNone/>
+              <a:defRPr sz="623" b="1"/>
             </a:lvl5pPr>
-            <a:lvl6pPr marL="2286000" indent="0">
-              <a:buNone/>
-              <a:defRPr sz="1600" b="1"/>
+            <a:lvl6pPr marL="889483" indent="0">
+              <a:buNone/>
+              <a:defRPr sz="623" b="1"/>
             </a:lvl6pPr>
-            <a:lvl7pPr marL="2743200" indent="0">
-              <a:buNone/>
-              <a:defRPr sz="1600" b="1"/>
+            <a:lvl7pPr marL="1067379" indent="0">
+              <a:buNone/>
+              <a:defRPr sz="623" b="1"/>
             </a:lvl7pPr>
-            <a:lvl8pPr marL="3200400" indent="0">
-              <a:buNone/>
-              <a:defRPr sz="1600" b="1"/>
+            <a:lvl8pPr marL="1245276" indent="0">
+              <a:buNone/>
+              <a:defRPr sz="623" b="1"/>
             </a:lvl8pPr>
-            <a:lvl9pPr marL="3657600" indent="0">
-              <a:buNone/>
-              <a:defRPr sz="1600" b="1"/>
+            <a:lvl9pPr marL="1423172" indent="0">
+              <a:buNone/>
+              <a:defRPr sz="623" b="1"/>
             </a:lvl9pPr>
           </a:lstStyle>
           <a:p>
@@ -1745,13 +1549,7 @@
       </p:sp>
       <p:sp>
         <p:nvSpPr>
-          <p:cNvPr id="6" name="Tijdelijke aanduiding voor inhoud 5">
-            <a:extLst>
-              <a:ext uri="{FF2B5EF4-FFF2-40B4-BE49-F238E27FC236}">
-                <a16:creationId xmlns:a16="http://schemas.microsoft.com/office/drawing/2014/main" id="{08640576-5431-9E4E-8581-83508C2F5806}"/>
-              </a:ext>
-            </a:extLst>
-          </p:cNvPr>
+          <p:cNvPr id="6" name="Content Placeholder 5"/>
           <p:cNvSpPr>
             <a:spLocks noGrp="1"/>
           </p:cNvSpPr>
@@ -1761,8 +1559,8 @@
         </p:nvSpPr>
         <p:spPr>
           <a:xfrm>
-            <a:off x="6172200" y="2505075"/>
-            <a:ext cx="5183188" cy="3684588"/>
+            <a:off x="1801029" y="975936"/>
+            <a:ext cx="1512438" cy="1435454"/>
           </a:xfrm>
         </p:spPr>
         <p:txBody>
@@ -1802,19 +1600,13 @@
               <a:rPr lang="nl-NL"/>
               <a:t>Vijfde niveau</a:t>
             </a:r>
-            <a:endParaRPr lang="en-US"/>
-          </a:p>
-        </p:txBody>
-      </p:sp>
-      <p:sp>
-        <p:nvSpPr>
-          <p:cNvPr id="7" name="Tijdelijke aanduiding voor datum 6">
-            <a:extLst>
-              <a:ext uri="{FF2B5EF4-FFF2-40B4-BE49-F238E27FC236}">
-                <a16:creationId xmlns:a16="http://schemas.microsoft.com/office/drawing/2014/main" id="{655A05D0-D969-0D47-7B51-E5F6C990DE75}"/>
-              </a:ext>
-            </a:extLst>
-          </p:cNvPr>
+            <a:endParaRPr lang="en-US" dirty="0"/>
+          </a:p>
+        </p:txBody>
+      </p:sp>
+      <p:sp>
+        <p:nvSpPr>
+          <p:cNvPr id="7" name="Date Placeholder 6"/>
           <p:cNvSpPr>
             <a:spLocks noGrp="1"/>
           </p:cNvSpPr>
@@ -1837,13 +1629,7 @@
       </p:sp>
       <p:sp>
         <p:nvSpPr>
-          <p:cNvPr id="8" name="Tijdelijke aanduiding voor voettekst 7">
-            <a:extLst>
-              <a:ext uri="{FF2B5EF4-FFF2-40B4-BE49-F238E27FC236}">
-                <a16:creationId xmlns:a16="http://schemas.microsoft.com/office/drawing/2014/main" id="{A5E8B307-8405-47D8-B563-3932D6E033A8}"/>
-              </a:ext>
-            </a:extLst>
-          </p:cNvPr>
+          <p:cNvPr id="8" name="Footer Placeholder 7"/>
           <p:cNvSpPr>
             <a:spLocks noGrp="1"/>
           </p:cNvSpPr>
@@ -1862,13 +1648,7 @@
       </p:sp>
       <p:sp>
         <p:nvSpPr>
-          <p:cNvPr id="9" name="Tijdelijke aanduiding voor dianummer 8">
-            <a:extLst>
-              <a:ext uri="{FF2B5EF4-FFF2-40B4-BE49-F238E27FC236}">
-                <a16:creationId xmlns:a16="http://schemas.microsoft.com/office/drawing/2014/main" id="{7C6B7433-EDDA-77A2-0248-D74F2EC692C3}"/>
-              </a:ext>
-            </a:extLst>
-          </p:cNvPr>
+          <p:cNvPr id="9" name="Slide Number Placeholder 8"/>
           <p:cNvSpPr>
             <a:spLocks noGrp="1"/>
           </p:cNvSpPr>
@@ -1892,7 +1672,7 @@
     </p:spTree>
     <p:extLst>
       <p:ext uri="{BB962C8B-B14F-4D97-AF65-F5344CB8AC3E}">
-        <p14:creationId xmlns:p14="http://schemas.microsoft.com/office/powerpoint/2010/main" val="3935817899"/>
+        <p14:creationId xmlns:p14="http://schemas.microsoft.com/office/powerpoint/2010/main" val="2631723106"/>
       </p:ext>
     </p:extLst>
   </p:cSld>
@@ -1921,13 +1701,7 @@
       </p:grpSpPr>
       <p:sp>
         <p:nvSpPr>
-          <p:cNvPr id="2" name="Titel 1">
-            <a:extLst>
-              <a:ext uri="{FF2B5EF4-FFF2-40B4-BE49-F238E27FC236}">
-                <a16:creationId xmlns:a16="http://schemas.microsoft.com/office/drawing/2014/main" id="{63F48D71-02E6-15B9-1FC0-7332A38BEAB2}"/>
-              </a:ext>
-            </a:extLst>
-          </p:cNvPr>
+          <p:cNvPr id="2" name="Title 1"/>
           <p:cNvSpPr>
             <a:spLocks noGrp="1"/>
           </p:cNvSpPr>
@@ -1944,19 +1718,13 @@
               <a:rPr lang="nl-NL"/>
               <a:t>Klik om stijl te bewerken</a:t>
             </a:r>
-            <a:endParaRPr lang="en-US"/>
-          </a:p>
-        </p:txBody>
-      </p:sp>
-      <p:sp>
-        <p:nvSpPr>
-          <p:cNvPr id="3" name="Tijdelijke aanduiding voor datum 2">
-            <a:extLst>
-              <a:ext uri="{FF2B5EF4-FFF2-40B4-BE49-F238E27FC236}">
-                <a16:creationId xmlns:a16="http://schemas.microsoft.com/office/drawing/2014/main" id="{28E319E6-A970-0BBC-64CE-786C2D66C221}"/>
-              </a:ext>
-            </a:extLst>
-          </p:cNvPr>
+            <a:endParaRPr lang="en-US" dirty="0"/>
+          </a:p>
+        </p:txBody>
+      </p:sp>
+      <p:sp>
+        <p:nvSpPr>
+          <p:cNvPr id="3" name="Date Placeholder 2"/>
           <p:cNvSpPr>
             <a:spLocks noGrp="1"/>
           </p:cNvSpPr>
@@ -1979,13 +1747,7 @@
       </p:sp>
       <p:sp>
         <p:nvSpPr>
-          <p:cNvPr id="4" name="Tijdelijke aanduiding voor voettekst 3">
-            <a:extLst>
-              <a:ext uri="{FF2B5EF4-FFF2-40B4-BE49-F238E27FC236}">
-                <a16:creationId xmlns:a16="http://schemas.microsoft.com/office/drawing/2014/main" id="{55655065-D774-FFC4-0098-F6E41D56EEE6}"/>
-              </a:ext>
-            </a:extLst>
-          </p:cNvPr>
+          <p:cNvPr id="4" name="Footer Placeholder 3"/>
           <p:cNvSpPr>
             <a:spLocks noGrp="1"/>
           </p:cNvSpPr>
@@ -2004,13 +1766,7 @@
       </p:sp>
       <p:sp>
         <p:nvSpPr>
-          <p:cNvPr id="5" name="Tijdelijke aanduiding voor dianummer 4">
-            <a:extLst>
-              <a:ext uri="{FF2B5EF4-FFF2-40B4-BE49-F238E27FC236}">
-                <a16:creationId xmlns:a16="http://schemas.microsoft.com/office/drawing/2014/main" id="{B4A2C39F-E4A9-2636-5070-1CC34619DF93}"/>
-              </a:ext>
-            </a:extLst>
-          </p:cNvPr>
+          <p:cNvPr id="5" name="Slide Number Placeholder 4"/>
           <p:cNvSpPr>
             <a:spLocks noGrp="1"/>
           </p:cNvSpPr>
@@ -2034,7 +1790,7 @@
     </p:spTree>
     <p:extLst>
       <p:ext uri="{BB962C8B-B14F-4D97-AF65-F5344CB8AC3E}">
-        <p14:creationId xmlns:p14="http://schemas.microsoft.com/office/powerpoint/2010/main" val="1028876625"/>
+        <p14:creationId xmlns:p14="http://schemas.microsoft.com/office/powerpoint/2010/main" val="3513850412"/>
       </p:ext>
     </p:extLst>
   </p:cSld>
@@ -2063,13 +1819,7 @@
       </p:grpSpPr>
       <p:sp>
         <p:nvSpPr>
-          <p:cNvPr id="2" name="Tijdelijke aanduiding voor datum 1">
-            <a:extLst>
-              <a:ext uri="{FF2B5EF4-FFF2-40B4-BE49-F238E27FC236}">
-                <a16:creationId xmlns:a16="http://schemas.microsoft.com/office/drawing/2014/main" id="{339F152D-5F45-1073-E79F-5B9E08462853}"/>
-              </a:ext>
-            </a:extLst>
-          </p:cNvPr>
+          <p:cNvPr id="2" name="Date Placeholder 1"/>
           <p:cNvSpPr>
             <a:spLocks noGrp="1"/>
           </p:cNvSpPr>
@@ -2092,13 +1842,7 @@
       </p:sp>
       <p:sp>
         <p:nvSpPr>
-          <p:cNvPr id="3" name="Tijdelijke aanduiding voor voettekst 2">
-            <a:extLst>
-              <a:ext uri="{FF2B5EF4-FFF2-40B4-BE49-F238E27FC236}">
-                <a16:creationId xmlns:a16="http://schemas.microsoft.com/office/drawing/2014/main" id="{171B2907-F38E-BC03-D35F-523838C66F86}"/>
-              </a:ext>
-            </a:extLst>
-          </p:cNvPr>
+          <p:cNvPr id="3" name="Footer Placeholder 2"/>
           <p:cNvSpPr>
             <a:spLocks noGrp="1"/>
           </p:cNvSpPr>
@@ -2117,13 +1861,7 @@
       </p:sp>
       <p:sp>
         <p:nvSpPr>
-          <p:cNvPr id="4" name="Tijdelijke aanduiding voor dianummer 3">
-            <a:extLst>
-              <a:ext uri="{FF2B5EF4-FFF2-40B4-BE49-F238E27FC236}">
-                <a16:creationId xmlns:a16="http://schemas.microsoft.com/office/drawing/2014/main" id="{53EBBA2C-DCAD-8D6E-89C1-468F6D25687D}"/>
-              </a:ext>
-            </a:extLst>
-          </p:cNvPr>
+          <p:cNvPr id="4" name="Slide Number Placeholder 3"/>
           <p:cNvSpPr>
             <a:spLocks noGrp="1"/>
           </p:cNvSpPr>
@@ -2147,7 +1885,7 @@
     </p:spTree>
     <p:extLst>
       <p:ext uri="{BB962C8B-B14F-4D97-AF65-F5344CB8AC3E}">
-        <p14:creationId xmlns:p14="http://schemas.microsoft.com/office/powerpoint/2010/main" val="756223764"/>
+        <p14:creationId xmlns:p14="http://schemas.microsoft.com/office/powerpoint/2010/main" val="426353222"/>
       </p:ext>
     </p:extLst>
   </p:cSld>
@@ -2176,13 +1914,7 @@
       </p:grpSpPr>
       <p:sp>
         <p:nvSpPr>
-          <p:cNvPr id="2" name="Titel 1">
-            <a:extLst>
-              <a:ext uri="{FF2B5EF4-FFF2-40B4-BE49-F238E27FC236}">
-                <a16:creationId xmlns:a16="http://schemas.microsoft.com/office/drawing/2014/main" id="{C29CFBE0-CF37-3901-65FD-DAD977B6D9EB}"/>
-              </a:ext>
-            </a:extLst>
-          </p:cNvPr>
+          <p:cNvPr id="2" name="Title 1"/>
           <p:cNvSpPr>
             <a:spLocks noGrp="1"/>
           </p:cNvSpPr>
@@ -2192,15 +1924,15 @@
         </p:nvSpPr>
         <p:spPr>
           <a:xfrm>
-            <a:off x="839788" y="457200"/>
-            <a:ext cx="3932237" cy="1600200"/>
+            <a:off x="245047" y="178118"/>
+            <a:ext cx="1147415" cy="623411"/>
           </a:xfrm>
         </p:spPr>
         <p:txBody>
           <a:bodyPr anchor="b"/>
           <a:lstStyle>
             <a:lvl1pPr>
-              <a:defRPr sz="3200"/>
+              <a:defRPr sz="1245"/>
             </a:lvl1pPr>
           </a:lstStyle>
           <a:p>
@@ -2208,19 +1940,13 @@
               <a:rPr lang="nl-NL"/>
               <a:t>Klik om stijl te bewerken</a:t>
             </a:r>
-            <a:endParaRPr lang="en-US"/>
-          </a:p>
-        </p:txBody>
-      </p:sp>
-      <p:sp>
-        <p:nvSpPr>
-          <p:cNvPr id="3" name="Tijdelijke aanduiding voor inhoud 2">
-            <a:extLst>
-              <a:ext uri="{FF2B5EF4-FFF2-40B4-BE49-F238E27FC236}">
-                <a16:creationId xmlns:a16="http://schemas.microsoft.com/office/drawing/2014/main" id="{CED6AE04-0AFF-E488-6E9B-FFB6D6A73359}"/>
-              </a:ext>
-            </a:extLst>
-          </p:cNvPr>
+            <a:endParaRPr lang="en-US" dirty="0"/>
+          </a:p>
+        </p:txBody>
+      </p:sp>
+      <p:sp>
+        <p:nvSpPr>
+          <p:cNvPr id="3" name="Content Placeholder 2"/>
           <p:cNvSpPr>
             <a:spLocks noGrp="1"/>
           </p:cNvSpPr>
@@ -2230,39 +1956,39 @@
         </p:nvSpPr>
         <p:spPr>
           <a:xfrm>
-            <a:off x="5183188" y="987425"/>
-            <a:ext cx="6172200" cy="4873625"/>
+            <a:off x="1512438" y="384685"/>
+            <a:ext cx="1801029" cy="1898683"/>
           </a:xfrm>
         </p:spPr>
         <p:txBody>
           <a:bodyPr/>
           <a:lstStyle>
             <a:lvl1pPr>
-              <a:defRPr sz="3200"/>
+              <a:defRPr sz="1245"/>
             </a:lvl1pPr>
             <a:lvl2pPr>
-              <a:defRPr sz="2800"/>
+              <a:defRPr sz="1089"/>
             </a:lvl2pPr>
             <a:lvl3pPr>
-              <a:defRPr sz="2400"/>
+              <a:defRPr sz="934"/>
             </a:lvl3pPr>
             <a:lvl4pPr>
-              <a:defRPr sz="2000"/>
+              <a:defRPr sz="778"/>
             </a:lvl4pPr>
             <a:lvl5pPr>
-              <a:defRPr sz="2000"/>
+              <a:defRPr sz="778"/>
             </a:lvl5pPr>
             <a:lvl6pPr>
-              <a:defRPr sz="2000"/>
+              <a:defRPr sz="778"/>
             </a:lvl6pPr>
             <a:lvl7pPr>
-              <a:defRPr sz="2000"/>
+              <a:defRPr sz="778"/>
             </a:lvl7pPr>
             <a:lvl8pPr>
-              <a:defRPr sz="2000"/>
+              <a:defRPr sz="778"/>
             </a:lvl8pPr>
             <a:lvl9pPr>
-              <a:defRPr sz="2000"/>
+              <a:defRPr sz="778"/>
             </a:lvl9pPr>
           </a:lstStyle>
           <a:p>
@@ -2299,19 +2025,13 @@
               <a:rPr lang="nl-NL"/>
               <a:t>Vijfde niveau</a:t>
             </a:r>
-            <a:endParaRPr lang="en-US"/>
-          </a:p>
-        </p:txBody>
-      </p:sp>
-      <p:sp>
-        <p:nvSpPr>
-          <p:cNvPr id="4" name="Tijdelijke aanduiding voor tekst 3">
-            <a:extLst>
-              <a:ext uri="{FF2B5EF4-FFF2-40B4-BE49-F238E27FC236}">
-                <a16:creationId xmlns:a16="http://schemas.microsoft.com/office/drawing/2014/main" id="{44298094-9DEB-F52D-24AC-85B1CD301FA6}"/>
-              </a:ext>
-            </a:extLst>
-          </p:cNvPr>
+            <a:endParaRPr lang="en-US" dirty="0"/>
+          </a:p>
+        </p:txBody>
+      </p:sp>
+      <p:sp>
+        <p:nvSpPr>
+          <p:cNvPr id="4" name="Text Placeholder 3"/>
           <p:cNvSpPr>
             <a:spLocks noGrp="1"/>
           </p:cNvSpPr>
@@ -2321,8 +2041,8 @@
         </p:nvSpPr>
         <p:spPr>
           <a:xfrm>
-            <a:off x="839788" y="2057400"/>
-            <a:ext cx="3932237" cy="3811588"/>
+            <a:off x="245047" y="801529"/>
+            <a:ext cx="1147415" cy="1484931"/>
           </a:xfrm>
         </p:spPr>
         <p:txBody>
@@ -2330,39 +2050,39 @@
           <a:lstStyle>
             <a:lvl1pPr marL="0" indent="0">
               <a:buNone/>
-              <a:defRPr sz="1600"/>
+              <a:defRPr sz="623"/>
             </a:lvl1pPr>
-            <a:lvl2pPr marL="457200" indent="0">
-              <a:buNone/>
-              <a:defRPr sz="1400"/>
+            <a:lvl2pPr marL="177897" indent="0">
+              <a:buNone/>
+              <a:defRPr sz="545"/>
             </a:lvl2pPr>
-            <a:lvl3pPr marL="914400" indent="0">
-              <a:buNone/>
-              <a:defRPr sz="1200"/>
+            <a:lvl3pPr marL="355793" indent="0">
+              <a:buNone/>
+              <a:defRPr sz="467"/>
             </a:lvl3pPr>
-            <a:lvl4pPr marL="1371600" indent="0">
-              <a:buNone/>
-              <a:defRPr sz="1000"/>
+            <a:lvl4pPr marL="533690" indent="0">
+              <a:buNone/>
+              <a:defRPr sz="389"/>
             </a:lvl4pPr>
-            <a:lvl5pPr marL="1828800" indent="0">
-              <a:buNone/>
-              <a:defRPr sz="1000"/>
+            <a:lvl5pPr marL="711586" indent="0">
+              <a:buNone/>
+              <a:defRPr sz="389"/>
             </a:lvl5pPr>
-            <a:lvl6pPr marL="2286000" indent="0">
-              <a:buNone/>
-              <a:defRPr sz="1000"/>
+            <a:lvl6pPr marL="889483" indent="0">
+              <a:buNone/>
+              <a:defRPr sz="389"/>
             </a:lvl6pPr>
-            <a:lvl7pPr marL="2743200" indent="0">
-              <a:buNone/>
-              <a:defRPr sz="1000"/>
+            <a:lvl7pPr marL="1067379" indent="0">
+              <a:buNone/>
+              <a:defRPr sz="389"/>
             </a:lvl7pPr>
-            <a:lvl8pPr marL="3200400" indent="0">
-              <a:buNone/>
-              <a:defRPr sz="1000"/>
+            <a:lvl8pPr marL="1245276" indent="0">
+              <a:buNone/>
+              <a:defRPr sz="389"/>
             </a:lvl8pPr>
-            <a:lvl9pPr marL="3657600" indent="0">
-              <a:buNone/>
-              <a:defRPr sz="1000"/>
+            <a:lvl9pPr marL="1423172" indent="0">
+              <a:buNone/>
+              <a:defRPr sz="389"/>
             </a:lvl9pPr>
           </a:lstStyle>
           <a:p>
@@ -2376,13 +2096,7 @@
       </p:sp>
       <p:sp>
         <p:nvSpPr>
-          <p:cNvPr id="5" name="Tijdelijke aanduiding voor datum 4">
-            <a:extLst>
-              <a:ext uri="{FF2B5EF4-FFF2-40B4-BE49-F238E27FC236}">
-                <a16:creationId xmlns:a16="http://schemas.microsoft.com/office/drawing/2014/main" id="{01D9B62F-0EF4-1695-D4B2-14DD3E895F8B}"/>
-              </a:ext>
-            </a:extLst>
-          </p:cNvPr>
+          <p:cNvPr id="5" name="Date Placeholder 4"/>
           <p:cNvSpPr>
             <a:spLocks noGrp="1"/>
           </p:cNvSpPr>
@@ -2405,13 +2119,7 @@
       </p:sp>
       <p:sp>
         <p:nvSpPr>
-          <p:cNvPr id="6" name="Tijdelijke aanduiding voor voettekst 5">
-            <a:extLst>
-              <a:ext uri="{FF2B5EF4-FFF2-40B4-BE49-F238E27FC236}">
-                <a16:creationId xmlns:a16="http://schemas.microsoft.com/office/drawing/2014/main" id="{4F9595B4-E23F-CA89-B5C5-1C6297C5AE10}"/>
-              </a:ext>
-            </a:extLst>
-          </p:cNvPr>
+          <p:cNvPr id="6" name="Footer Placeholder 5"/>
           <p:cNvSpPr>
             <a:spLocks noGrp="1"/>
           </p:cNvSpPr>
@@ -2430,13 +2138,7 @@
       </p:sp>
       <p:sp>
         <p:nvSpPr>
-          <p:cNvPr id="7" name="Tijdelijke aanduiding voor dianummer 6">
-            <a:extLst>
-              <a:ext uri="{FF2B5EF4-FFF2-40B4-BE49-F238E27FC236}">
-                <a16:creationId xmlns:a16="http://schemas.microsoft.com/office/drawing/2014/main" id="{5487B2B6-CB12-BC0D-3393-A0538234ABAC}"/>
-              </a:ext>
-            </a:extLst>
-          </p:cNvPr>
+          <p:cNvPr id="7" name="Slide Number Placeholder 6"/>
           <p:cNvSpPr>
             <a:spLocks noGrp="1"/>
           </p:cNvSpPr>
@@ -2460,7 +2162,7 @@
     </p:spTree>
     <p:extLst>
       <p:ext uri="{BB962C8B-B14F-4D97-AF65-F5344CB8AC3E}">
-        <p14:creationId xmlns:p14="http://schemas.microsoft.com/office/powerpoint/2010/main" val="1907664744"/>
+        <p14:creationId xmlns:p14="http://schemas.microsoft.com/office/powerpoint/2010/main" val="1634581552"/>
       </p:ext>
     </p:extLst>
   </p:cSld>
@@ -2489,13 +2191,7 @@
       </p:grpSpPr>
       <p:sp>
         <p:nvSpPr>
-          <p:cNvPr id="2" name="Titel 1">
-            <a:extLst>
-              <a:ext uri="{FF2B5EF4-FFF2-40B4-BE49-F238E27FC236}">
-                <a16:creationId xmlns:a16="http://schemas.microsoft.com/office/drawing/2014/main" id="{F7859175-CEDC-60F7-6E3E-637C990F47DC}"/>
-              </a:ext>
-            </a:extLst>
-          </p:cNvPr>
+          <p:cNvPr id="2" name="Title 1"/>
           <p:cNvSpPr>
             <a:spLocks noGrp="1"/>
           </p:cNvSpPr>
@@ -2505,15 +2201,15 @@
         </p:nvSpPr>
         <p:spPr>
           <a:xfrm>
-            <a:off x="839788" y="457200"/>
-            <a:ext cx="3932237" cy="1600200"/>
+            <a:off x="245047" y="178118"/>
+            <a:ext cx="1147415" cy="623411"/>
           </a:xfrm>
         </p:spPr>
         <p:txBody>
           <a:bodyPr anchor="b"/>
           <a:lstStyle>
             <a:lvl1pPr>
-              <a:defRPr sz="3200"/>
+              <a:defRPr sz="1245"/>
             </a:lvl1pPr>
           </a:lstStyle>
           <a:p>
@@ -2521,21 +2217,15 @@
               <a:rPr lang="nl-NL"/>
               <a:t>Klik om stijl te bewerken</a:t>
             </a:r>
-            <a:endParaRPr lang="en-US"/>
-          </a:p>
-        </p:txBody>
-      </p:sp>
-      <p:sp>
-        <p:nvSpPr>
-          <p:cNvPr id="3" name="Tijdelijke aanduiding voor afbeelding 2">
-            <a:extLst>
-              <a:ext uri="{FF2B5EF4-FFF2-40B4-BE49-F238E27FC236}">
-                <a16:creationId xmlns:a16="http://schemas.microsoft.com/office/drawing/2014/main" id="{54C6FC8D-C91D-524F-DFCF-C02738CAAA0F}"/>
-              </a:ext>
-            </a:extLst>
-          </p:cNvPr>
-          <p:cNvSpPr>
-            <a:spLocks noGrp="1"/>
+            <a:endParaRPr lang="en-US" dirty="0"/>
+          </a:p>
+        </p:txBody>
+      </p:sp>
+      <p:sp>
+        <p:nvSpPr>
+          <p:cNvPr id="3" name="Picture Placeholder 2"/>
+          <p:cNvSpPr>
+            <a:spLocks noGrp="1" noChangeAspect="1"/>
           </p:cNvSpPr>
           <p:nvPr>
             <p:ph type="pic" idx="1"/>
@@ -2543,64 +2233,62 @@
         </p:nvSpPr>
         <p:spPr>
           <a:xfrm>
-            <a:off x="5183188" y="987425"/>
-            <a:ext cx="6172200" cy="4873625"/>
+            <a:off x="1512438" y="384685"/>
+            <a:ext cx="1801029" cy="1898683"/>
           </a:xfrm>
         </p:spPr>
         <p:txBody>
-          <a:bodyPr/>
+          <a:bodyPr anchor="t"/>
           <a:lstStyle>
             <a:lvl1pPr marL="0" indent="0">
               <a:buNone/>
-              <a:defRPr sz="3200"/>
+              <a:defRPr sz="1245"/>
             </a:lvl1pPr>
-            <a:lvl2pPr marL="457200" indent="0">
-              <a:buNone/>
-              <a:defRPr sz="2800"/>
+            <a:lvl2pPr marL="177897" indent="0">
+              <a:buNone/>
+              <a:defRPr sz="1089"/>
             </a:lvl2pPr>
-            <a:lvl3pPr marL="914400" indent="0">
-              <a:buNone/>
-              <a:defRPr sz="2400"/>
+            <a:lvl3pPr marL="355793" indent="0">
+              <a:buNone/>
+              <a:defRPr sz="934"/>
             </a:lvl3pPr>
-            <a:lvl4pPr marL="1371600" indent="0">
-              <a:buNone/>
-              <a:defRPr sz="2000"/>
+            <a:lvl4pPr marL="533690" indent="0">
+              <a:buNone/>
+              <a:defRPr sz="778"/>
             </a:lvl4pPr>
-            <a:lvl5pPr marL="1828800" indent="0">
-              <a:buNone/>
-              <a:defRPr sz="2000"/>
+            <a:lvl5pPr marL="711586" indent="0">
+              <a:buNone/>
+              <a:defRPr sz="778"/>
             </a:lvl5pPr>
-            <a:lvl6pPr marL="2286000" indent="0">
-              <a:buNone/>
-              <a:defRPr sz="2000"/>
+            <a:lvl6pPr marL="889483" indent="0">
+              <a:buNone/>
+              <a:defRPr sz="778"/>
             </a:lvl6pPr>
-            <a:lvl7pPr marL="2743200" indent="0">
-              <a:buNone/>
-              <a:defRPr sz="2000"/>
+            <a:lvl7pPr marL="1067379" indent="0">
+              <a:buNone/>
+              <a:defRPr sz="778"/>
             </a:lvl7pPr>
-            <a:lvl8pPr marL="3200400" indent="0">
-              <a:buNone/>
-              <a:defRPr sz="2000"/>
+            <a:lvl8pPr marL="1245276" indent="0">
+              <a:buNone/>
+              <a:defRPr sz="778"/>
             </a:lvl8pPr>
-            <a:lvl9pPr marL="3657600" indent="0">
-              <a:buNone/>
-              <a:defRPr sz="2000"/>
+            <a:lvl9pPr marL="1423172" indent="0">
+              <a:buNone/>
+              <a:defRPr sz="778"/>
             </a:lvl9pPr>
           </a:lstStyle>
           <a:p>
-            <a:endParaRPr lang="en-US"/>
-          </a:p>
-        </p:txBody>
-      </p:sp>
-      <p:sp>
-        <p:nvSpPr>
-          <p:cNvPr id="4" name="Tijdelijke aanduiding voor tekst 3">
-            <a:extLst>
-              <a:ext uri="{FF2B5EF4-FFF2-40B4-BE49-F238E27FC236}">
-                <a16:creationId xmlns:a16="http://schemas.microsoft.com/office/drawing/2014/main" id="{8ECF04B4-7666-D61C-9BED-C1FEF06945A4}"/>
-              </a:ext>
-            </a:extLst>
-          </p:cNvPr>
+            <a:r>
+              <a:rPr lang="nl-NL"/>
+              <a:t>Klik op het pictogram als u een afbeelding wilt toevoegen</a:t>
+            </a:r>
+            <a:endParaRPr lang="en-US" dirty="0"/>
+          </a:p>
+        </p:txBody>
+      </p:sp>
+      <p:sp>
+        <p:nvSpPr>
+          <p:cNvPr id="4" name="Text Placeholder 3"/>
           <p:cNvSpPr>
             <a:spLocks noGrp="1"/>
           </p:cNvSpPr>
@@ -2610,8 +2298,8 @@
         </p:nvSpPr>
         <p:spPr>
           <a:xfrm>
-            <a:off x="839788" y="2057400"/>
-            <a:ext cx="3932237" cy="3811588"/>
+            <a:off x="245047" y="801529"/>
+            <a:ext cx="1147415" cy="1484931"/>
           </a:xfrm>
         </p:spPr>
         <p:txBody>
@@ -2619,39 +2307,39 @@
           <a:lstStyle>
             <a:lvl1pPr marL="0" indent="0">
               <a:buNone/>
-              <a:defRPr sz="1600"/>
+              <a:defRPr sz="623"/>
             </a:lvl1pPr>
-            <a:lvl2pPr marL="457200" indent="0">
-              <a:buNone/>
-              <a:defRPr sz="1400"/>
+            <a:lvl2pPr marL="177897" indent="0">
+              <a:buNone/>
+              <a:defRPr sz="545"/>
             </a:lvl2pPr>
-            <a:lvl3pPr marL="914400" indent="0">
-              <a:buNone/>
-              <a:defRPr sz="1200"/>
+            <a:lvl3pPr marL="355793" indent="0">
+              <a:buNone/>
+              <a:defRPr sz="467"/>
             </a:lvl3pPr>
-            <a:lvl4pPr marL="1371600" indent="0">
-              <a:buNone/>
-              <a:defRPr sz="1000"/>
+            <a:lvl4pPr marL="533690" indent="0">
+              <a:buNone/>
+              <a:defRPr sz="389"/>
             </a:lvl4pPr>
-            <a:lvl5pPr marL="1828800" indent="0">
-              <a:buNone/>
-              <a:defRPr sz="1000"/>
+            <a:lvl5pPr marL="711586" indent="0">
+              <a:buNone/>
+              <a:defRPr sz="389"/>
             </a:lvl5pPr>
-            <a:lvl6pPr marL="2286000" indent="0">
-              <a:buNone/>
-              <a:defRPr sz="1000"/>
+            <a:lvl6pPr marL="889483" indent="0">
+              <a:buNone/>
+              <a:defRPr sz="389"/>
             </a:lvl6pPr>
-            <a:lvl7pPr marL="2743200" indent="0">
-              <a:buNone/>
-              <a:defRPr sz="1000"/>
+            <a:lvl7pPr marL="1067379" indent="0">
+              <a:buNone/>
+              <a:defRPr sz="389"/>
             </a:lvl7pPr>
-            <a:lvl8pPr marL="3200400" indent="0">
-              <a:buNone/>
-              <a:defRPr sz="1000"/>
+            <a:lvl8pPr marL="1245276" indent="0">
+              <a:buNone/>
+              <a:defRPr sz="389"/>
             </a:lvl8pPr>
-            <a:lvl9pPr marL="3657600" indent="0">
-              <a:buNone/>
-              <a:defRPr sz="1000"/>
+            <a:lvl9pPr marL="1423172" indent="0">
+              <a:buNone/>
+              <a:defRPr sz="389"/>
             </a:lvl9pPr>
           </a:lstStyle>
           <a:p>
@@ -2665,13 +2353,7 @@
       </p:sp>
       <p:sp>
         <p:nvSpPr>
-          <p:cNvPr id="5" name="Tijdelijke aanduiding voor datum 4">
-            <a:extLst>
-              <a:ext uri="{FF2B5EF4-FFF2-40B4-BE49-F238E27FC236}">
-                <a16:creationId xmlns:a16="http://schemas.microsoft.com/office/drawing/2014/main" id="{1351C4B5-6846-42DE-A230-97D75E27414A}"/>
-              </a:ext>
-            </a:extLst>
-          </p:cNvPr>
+          <p:cNvPr id="5" name="Date Placeholder 4"/>
           <p:cNvSpPr>
             <a:spLocks noGrp="1"/>
           </p:cNvSpPr>
@@ -2694,13 +2376,7 @@
       </p:sp>
       <p:sp>
         <p:nvSpPr>
-          <p:cNvPr id="6" name="Tijdelijke aanduiding voor voettekst 5">
-            <a:extLst>
-              <a:ext uri="{FF2B5EF4-FFF2-40B4-BE49-F238E27FC236}">
-                <a16:creationId xmlns:a16="http://schemas.microsoft.com/office/drawing/2014/main" id="{204015C0-455B-2C0B-549C-FDBB43B52CC7}"/>
-              </a:ext>
-            </a:extLst>
-          </p:cNvPr>
+          <p:cNvPr id="6" name="Footer Placeholder 5"/>
           <p:cNvSpPr>
             <a:spLocks noGrp="1"/>
           </p:cNvSpPr>
@@ -2719,13 +2395,7 @@
       </p:sp>
       <p:sp>
         <p:nvSpPr>
-          <p:cNvPr id="7" name="Tijdelijke aanduiding voor dianummer 6">
-            <a:extLst>
-              <a:ext uri="{FF2B5EF4-FFF2-40B4-BE49-F238E27FC236}">
-                <a16:creationId xmlns:a16="http://schemas.microsoft.com/office/drawing/2014/main" id="{DCBDFF22-7225-B121-0C8F-E14702B91E15}"/>
-              </a:ext>
-            </a:extLst>
-          </p:cNvPr>
+          <p:cNvPr id="7" name="Slide Number Placeholder 6"/>
           <p:cNvSpPr>
             <a:spLocks noGrp="1"/>
           </p:cNvSpPr>
@@ -2749,7 +2419,7 @@
     </p:spTree>
     <p:extLst>
       <p:ext uri="{BB962C8B-B14F-4D97-AF65-F5344CB8AC3E}">
-        <p14:creationId xmlns:p14="http://schemas.microsoft.com/office/powerpoint/2010/main" val="3715533897"/>
+        <p14:creationId xmlns:p14="http://schemas.microsoft.com/office/powerpoint/2010/main" val="849307997"/>
       </p:ext>
     </p:extLst>
   </p:cSld>
@@ -2783,13 +2453,7 @@
       </p:grpSpPr>
       <p:sp>
         <p:nvSpPr>
-          <p:cNvPr id="2" name="Tijdelijke aanduiding voor titel 1">
-            <a:extLst>
-              <a:ext uri="{FF2B5EF4-FFF2-40B4-BE49-F238E27FC236}">
-                <a16:creationId xmlns:a16="http://schemas.microsoft.com/office/drawing/2014/main" id="{866F1998-E60F-C977-1A2A-C62D7DDB56DB}"/>
-              </a:ext>
-            </a:extLst>
-          </p:cNvPr>
+          <p:cNvPr id="2" name="Title Placeholder 1"/>
           <p:cNvSpPr>
             <a:spLocks noGrp="1"/>
           </p:cNvSpPr>
@@ -2799,8 +2463,8 @@
         </p:nvSpPr>
         <p:spPr>
           <a:xfrm>
-            <a:off x="838200" y="365125"/>
-            <a:ext cx="10515600" cy="1325563"/>
+            <a:off x="244584" y="142247"/>
+            <a:ext cx="3068420" cy="516417"/>
           </a:xfrm>
           <a:prstGeom prst="rect">
             <a:avLst/>
@@ -2816,19 +2480,13 @@
               <a:rPr lang="nl-NL"/>
               <a:t>Klik om stijl te bewerken</a:t>
             </a:r>
-            <a:endParaRPr lang="en-US"/>
-          </a:p>
-        </p:txBody>
-      </p:sp>
-      <p:sp>
-        <p:nvSpPr>
-          <p:cNvPr id="3" name="Tijdelijke aanduiding voor tekst 2">
-            <a:extLst>
-              <a:ext uri="{FF2B5EF4-FFF2-40B4-BE49-F238E27FC236}">
-                <a16:creationId xmlns:a16="http://schemas.microsoft.com/office/drawing/2014/main" id="{252539BA-A47C-47BC-A9F7-1AF1264059CC}"/>
-              </a:ext>
-            </a:extLst>
-          </p:cNvPr>
+            <a:endParaRPr lang="en-US" dirty="0"/>
+          </a:p>
+        </p:txBody>
+      </p:sp>
+      <p:sp>
+        <p:nvSpPr>
+          <p:cNvPr id="3" name="Text Placeholder 2"/>
           <p:cNvSpPr>
             <a:spLocks noGrp="1"/>
           </p:cNvSpPr>
@@ -2838,8 +2496,8 @@
         </p:nvSpPr>
         <p:spPr>
           <a:xfrm>
-            <a:off x="838200" y="1825625"/>
-            <a:ext cx="10515600" cy="4351338"/>
+            <a:off x="244584" y="711233"/>
+            <a:ext cx="3068420" cy="1695209"/>
           </a:xfrm>
           <a:prstGeom prst="rect">
             <a:avLst/>
@@ -2884,19 +2542,13 @@
               <a:rPr lang="nl-NL"/>
               <a:t>Vijfde niveau</a:t>
             </a:r>
-            <a:endParaRPr lang="en-US"/>
-          </a:p>
-        </p:txBody>
-      </p:sp>
-      <p:sp>
-        <p:nvSpPr>
-          <p:cNvPr id="4" name="Tijdelijke aanduiding voor datum 3">
-            <a:extLst>
-              <a:ext uri="{FF2B5EF4-FFF2-40B4-BE49-F238E27FC236}">
-                <a16:creationId xmlns:a16="http://schemas.microsoft.com/office/drawing/2014/main" id="{16B0D5D3-5231-D561-DBC6-2710209A62E4}"/>
-              </a:ext>
-            </a:extLst>
-          </p:cNvPr>
+            <a:endParaRPr lang="en-US" dirty="0"/>
+          </a:p>
+        </p:txBody>
+      </p:sp>
+      <p:sp>
+        <p:nvSpPr>
+          <p:cNvPr id="4" name="Date Placeholder 3"/>
           <p:cNvSpPr>
             <a:spLocks noGrp="1"/>
           </p:cNvSpPr>
@@ -2906,8 +2558,8 @@
         </p:nvSpPr>
         <p:spPr>
           <a:xfrm>
-            <a:off x="838200" y="6356350"/>
-            <a:ext cx="2743200" cy="365125"/>
+            <a:off x="244584" y="2476329"/>
+            <a:ext cx="800457" cy="142247"/>
           </a:xfrm>
           <a:prstGeom prst="rect">
             <a:avLst/>
@@ -2917,7 +2569,7 @@
           <a:bodyPr vert="horz" lIns="91440" tIns="45720" rIns="91440" bIns="45720" rtlCol="0" anchor="ctr"/>
           <a:lstStyle>
             <a:lvl1pPr algn="l">
-              <a:defRPr sz="1200">
+              <a:defRPr sz="467">
                 <a:solidFill>
                   <a:schemeClr val="tx1">
                     <a:tint val="75000"/>
@@ -2937,13 +2589,7 @@
       </p:sp>
       <p:sp>
         <p:nvSpPr>
-          <p:cNvPr id="5" name="Tijdelijke aanduiding voor voettekst 4">
-            <a:extLst>
-              <a:ext uri="{FF2B5EF4-FFF2-40B4-BE49-F238E27FC236}">
-                <a16:creationId xmlns:a16="http://schemas.microsoft.com/office/drawing/2014/main" id="{D51C335E-FBD4-C809-C17C-139D52529688}"/>
-              </a:ext>
-            </a:extLst>
-          </p:cNvPr>
+          <p:cNvPr id="5" name="Footer Placeholder 4"/>
           <p:cNvSpPr>
             <a:spLocks noGrp="1"/>
           </p:cNvSpPr>
@@ -2953,8 +2599,8 @@
         </p:nvSpPr>
         <p:spPr>
           <a:xfrm>
-            <a:off x="4038600" y="6356350"/>
-            <a:ext cx="4114800" cy="365125"/>
+            <a:off x="1178451" y="2476329"/>
+            <a:ext cx="1200686" cy="142247"/>
           </a:xfrm>
           <a:prstGeom prst="rect">
             <a:avLst/>
@@ -2964,7 +2610,7 @@
           <a:bodyPr vert="horz" lIns="91440" tIns="45720" rIns="91440" bIns="45720" rtlCol="0" anchor="ctr"/>
           <a:lstStyle>
             <a:lvl1pPr algn="ctr">
-              <a:defRPr sz="1200">
+              <a:defRPr sz="467">
                 <a:solidFill>
                   <a:schemeClr val="tx1">
                     <a:tint val="75000"/>
@@ -2980,13 +2626,7 @@
       </p:sp>
       <p:sp>
         <p:nvSpPr>
-          <p:cNvPr id="6" name="Tijdelijke aanduiding voor dianummer 5">
-            <a:extLst>
-              <a:ext uri="{FF2B5EF4-FFF2-40B4-BE49-F238E27FC236}">
-                <a16:creationId xmlns:a16="http://schemas.microsoft.com/office/drawing/2014/main" id="{2A0F2F1E-9DF0-A2EF-4FAE-05A8EF91DF7A}"/>
-              </a:ext>
-            </a:extLst>
-          </p:cNvPr>
+          <p:cNvPr id="6" name="Slide Number Placeholder 5"/>
           <p:cNvSpPr>
             <a:spLocks noGrp="1"/>
           </p:cNvSpPr>
@@ -2996,8 +2636,8 @@
         </p:nvSpPr>
         <p:spPr>
           <a:xfrm>
-            <a:off x="8610600" y="6356350"/>
-            <a:ext cx="2743200" cy="365125"/>
+            <a:off x="2512547" y="2476329"/>
+            <a:ext cx="800457" cy="142247"/>
           </a:xfrm>
           <a:prstGeom prst="rect">
             <a:avLst/>
@@ -3007,7 +2647,7 @@
           <a:bodyPr vert="horz" lIns="91440" tIns="45720" rIns="91440" bIns="45720" rtlCol="0" anchor="ctr"/>
           <a:lstStyle>
             <a:lvl1pPr algn="r">
-              <a:defRPr sz="1200">
+              <a:defRPr sz="467">
                 <a:solidFill>
                   <a:schemeClr val="tx1">
                     <a:tint val="75000"/>
@@ -3028,27 +2668,27 @@
     </p:spTree>
     <p:extLst>
       <p:ext uri="{BB962C8B-B14F-4D97-AF65-F5344CB8AC3E}">
-        <p14:creationId xmlns:p14="http://schemas.microsoft.com/office/powerpoint/2010/main" val="1563570601"/>
+        <p14:creationId xmlns:p14="http://schemas.microsoft.com/office/powerpoint/2010/main" val="2438495244"/>
       </p:ext>
     </p:extLst>
   </p:cSld>
   <p:clrMap bg1="lt1" tx1="dk1" bg2="lt2" tx2="dk2" accent1="accent1" accent2="accent2" accent3="accent3" accent4="accent4" accent5="accent5" accent6="accent6" hlink="hlink" folHlink="folHlink"/>
   <p:sldLayoutIdLst>
-    <p:sldLayoutId id="2147483649" r:id="rId1"/>
-    <p:sldLayoutId id="2147483650" r:id="rId2"/>
-    <p:sldLayoutId id="2147483651" r:id="rId3"/>
-    <p:sldLayoutId id="2147483652" r:id="rId4"/>
-    <p:sldLayoutId id="2147483653" r:id="rId5"/>
-    <p:sldLayoutId id="2147483654" r:id="rId6"/>
-    <p:sldLayoutId id="2147483655" r:id="rId7"/>
-    <p:sldLayoutId id="2147483656" r:id="rId8"/>
-    <p:sldLayoutId id="2147483657" r:id="rId9"/>
-    <p:sldLayoutId id="2147483658" r:id="rId10"/>
-    <p:sldLayoutId id="2147483659" r:id="rId11"/>
+    <p:sldLayoutId id="2147483661" r:id="rId1"/>
+    <p:sldLayoutId id="2147483662" r:id="rId2"/>
+    <p:sldLayoutId id="2147483663" r:id="rId3"/>
+    <p:sldLayoutId id="2147483664" r:id="rId4"/>
+    <p:sldLayoutId id="2147483665" r:id="rId5"/>
+    <p:sldLayoutId id="2147483666" r:id="rId6"/>
+    <p:sldLayoutId id="2147483667" r:id="rId7"/>
+    <p:sldLayoutId id="2147483668" r:id="rId8"/>
+    <p:sldLayoutId id="2147483669" r:id="rId9"/>
+    <p:sldLayoutId id="2147483670" r:id="rId10"/>
+    <p:sldLayoutId id="2147483671" r:id="rId11"/>
   </p:sldLayoutIdLst>
   <p:txStyles>
     <p:titleStyle>
-      <a:lvl1pPr algn="l" defTabSz="914400" rtl="0" eaLnBrk="1" latinLnBrk="0" hangingPunct="1">
+      <a:lvl1pPr algn="l" defTabSz="355793" rtl="0" eaLnBrk="1" latinLnBrk="0" hangingPunct="1">
         <a:lnSpc>
           <a:spcPct val="90000"/>
         </a:lnSpc>
@@ -3056,7 +2696,7 @@
           <a:spcPct val="0"/>
         </a:spcBef>
         <a:buNone/>
-        <a:defRPr sz="4400" kern="1200">
+        <a:defRPr sz="1712" kern="1200">
           <a:solidFill>
             <a:schemeClr val="tx1"/>
           </a:solidFill>
@@ -3067,16 +2707,16 @@
       </a:lvl1pPr>
     </p:titleStyle>
     <p:bodyStyle>
-      <a:lvl1pPr marL="228600" indent="-228600" algn="l" defTabSz="914400" rtl="0" eaLnBrk="1" latinLnBrk="0" hangingPunct="1">
+      <a:lvl1pPr marL="88948" indent="-88948" algn="l" defTabSz="355793" rtl="0" eaLnBrk="1" latinLnBrk="0" hangingPunct="1">
         <a:lnSpc>
           <a:spcPct val="90000"/>
         </a:lnSpc>
         <a:spcBef>
-          <a:spcPts val="1000"/>
+          <a:spcPts val="389"/>
         </a:spcBef>
         <a:buFont typeface="Arial" panose="020B0604020202020204" pitchFamily="34" charset="0"/>
         <a:buChar char="•"/>
-        <a:defRPr sz="2800" kern="1200">
+        <a:defRPr sz="1089" kern="1200">
           <a:solidFill>
             <a:schemeClr val="tx1"/>
           </a:solidFill>
@@ -3085,16 +2725,16 @@
           <a:cs typeface="+mn-cs"/>
         </a:defRPr>
       </a:lvl1pPr>
-      <a:lvl2pPr marL="685800" indent="-228600" algn="l" defTabSz="914400" rtl="0" eaLnBrk="1" latinLnBrk="0" hangingPunct="1">
+      <a:lvl2pPr marL="266845" indent="-88948" algn="l" defTabSz="355793" rtl="0" eaLnBrk="1" latinLnBrk="0" hangingPunct="1">
         <a:lnSpc>
           <a:spcPct val="90000"/>
         </a:lnSpc>
         <a:spcBef>
-          <a:spcPts val="500"/>
+          <a:spcPts val="195"/>
         </a:spcBef>
         <a:buFont typeface="Arial" panose="020B0604020202020204" pitchFamily="34" charset="0"/>
         <a:buChar char="•"/>
-        <a:defRPr sz="2400" kern="1200">
+        <a:defRPr sz="934" kern="1200">
           <a:solidFill>
             <a:schemeClr val="tx1"/>
           </a:solidFill>
@@ -3103,16 +2743,16 @@
           <a:cs typeface="+mn-cs"/>
         </a:defRPr>
       </a:lvl2pPr>
-      <a:lvl3pPr marL="1143000" indent="-228600" algn="l" defTabSz="914400" rtl="0" eaLnBrk="1" latinLnBrk="0" hangingPunct="1">
+      <a:lvl3pPr marL="444741" indent="-88948" algn="l" defTabSz="355793" rtl="0" eaLnBrk="1" latinLnBrk="0" hangingPunct="1">
         <a:lnSpc>
           <a:spcPct val="90000"/>
         </a:lnSpc>
         <a:spcBef>
-          <a:spcPts val="500"/>
+          <a:spcPts val="195"/>
         </a:spcBef>
         <a:buFont typeface="Arial" panose="020B0604020202020204" pitchFamily="34" charset="0"/>
         <a:buChar char="•"/>
-        <a:defRPr sz="2000" kern="1200">
+        <a:defRPr sz="778" kern="1200">
           <a:solidFill>
             <a:schemeClr val="tx1"/>
           </a:solidFill>
@@ -3121,16 +2761,16 @@
           <a:cs typeface="+mn-cs"/>
         </a:defRPr>
       </a:lvl3pPr>
-      <a:lvl4pPr marL="1600200" indent="-228600" algn="l" defTabSz="914400" rtl="0" eaLnBrk="1" latinLnBrk="0" hangingPunct="1">
+      <a:lvl4pPr marL="622638" indent="-88948" algn="l" defTabSz="355793" rtl="0" eaLnBrk="1" latinLnBrk="0" hangingPunct="1">
         <a:lnSpc>
           <a:spcPct val="90000"/>
         </a:lnSpc>
         <a:spcBef>
-          <a:spcPts val="500"/>
+          <a:spcPts val="195"/>
         </a:spcBef>
         <a:buFont typeface="Arial" panose="020B0604020202020204" pitchFamily="34" charset="0"/>
         <a:buChar char="•"/>
-        <a:defRPr sz="1800" kern="1200">
+        <a:defRPr sz="700" kern="1200">
           <a:solidFill>
             <a:schemeClr val="tx1"/>
           </a:solidFill>
@@ -3139,16 +2779,16 @@
           <a:cs typeface="+mn-cs"/>
         </a:defRPr>
       </a:lvl4pPr>
-      <a:lvl5pPr marL="2057400" indent="-228600" algn="l" defTabSz="914400" rtl="0" eaLnBrk="1" latinLnBrk="0" hangingPunct="1">
+      <a:lvl5pPr marL="800534" indent="-88948" algn="l" defTabSz="355793" rtl="0" eaLnBrk="1" latinLnBrk="0" hangingPunct="1">
         <a:lnSpc>
           <a:spcPct val="90000"/>
         </a:lnSpc>
         <a:spcBef>
-          <a:spcPts val="500"/>
+          <a:spcPts val="195"/>
         </a:spcBef>
         <a:buFont typeface="Arial" panose="020B0604020202020204" pitchFamily="34" charset="0"/>
         <a:buChar char="•"/>
-        <a:defRPr sz="1800" kern="1200">
+        <a:defRPr sz="700" kern="1200">
           <a:solidFill>
             <a:schemeClr val="tx1"/>
           </a:solidFill>
@@ -3157,16 +2797,16 @@
           <a:cs typeface="+mn-cs"/>
         </a:defRPr>
       </a:lvl5pPr>
-      <a:lvl6pPr marL="2514600" indent="-228600" algn="l" defTabSz="914400" rtl="0" eaLnBrk="1" latinLnBrk="0" hangingPunct="1">
+      <a:lvl6pPr marL="978431" indent="-88948" algn="l" defTabSz="355793" rtl="0" eaLnBrk="1" latinLnBrk="0" hangingPunct="1">
         <a:lnSpc>
           <a:spcPct val="90000"/>
         </a:lnSpc>
         <a:spcBef>
-          <a:spcPts val="500"/>
+          <a:spcPts val="195"/>
         </a:spcBef>
         <a:buFont typeface="Arial" panose="020B0604020202020204" pitchFamily="34" charset="0"/>
         <a:buChar char="•"/>
-        <a:defRPr sz="1800" kern="1200">
+        <a:defRPr sz="700" kern="1200">
           <a:solidFill>
             <a:schemeClr val="tx1"/>
           </a:solidFill>
@@ -3175,16 +2815,16 @@
           <a:cs typeface="+mn-cs"/>
         </a:defRPr>
       </a:lvl6pPr>
-      <a:lvl7pPr marL="2971800" indent="-228600" algn="l" defTabSz="914400" rtl="0" eaLnBrk="1" latinLnBrk="0" hangingPunct="1">
+      <a:lvl7pPr marL="1156327" indent="-88948" algn="l" defTabSz="355793" rtl="0" eaLnBrk="1" latinLnBrk="0" hangingPunct="1">
         <a:lnSpc>
           <a:spcPct val="90000"/>
         </a:lnSpc>
         <a:spcBef>
-          <a:spcPts val="500"/>
+          <a:spcPts val="195"/>
         </a:spcBef>
         <a:buFont typeface="Arial" panose="020B0604020202020204" pitchFamily="34" charset="0"/>
         <a:buChar char="•"/>
-        <a:defRPr sz="1800" kern="1200">
+        <a:defRPr sz="700" kern="1200">
           <a:solidFill>
             <a:schemeClr val="tx1"/>
           </a:solidFill>
@@ -3193,16 +2833,16 @@
           <a:cs typeface="+mn-cs"/>
         </a:defRPr>
       </a:lvl7pPr>
-      <a:lvl8pPr marL="3429000" indent="-228600" algn="l" defTabSz="914400" rtl="0" eaLnBrk="1" latinLnBrk="0" hangingPunct="1">
+      <a:lvl8pPr marL="1334224" indent="-88948" algn="l" defTabSz="355793" rtl="0" eaLnBrk="1" latinLnBrk="0" hangingPunct="1">
         <a:lnSpc>
           <a:spcPct val="90000"/>
         </a:lnSpc>
         <a:spcBef>
-          <a:spcPts val="500"/>
+          <a:spcPts val="195"/>
         </a:spcBef>
         <a:buFont typeface="Arial" panose="020B0604020202020204" pitchFamily="34" charset="0"/>
         <a:buChar char="•"/>
-        <a:defRPr sz="1800" kern="1200">
+        <a:defRPr sz="700" kern="1200">
           <a:solidFill>
             <a:schemeClr val="tx1"/>
           </a:solidFill>
@@ -3211,16 +2851,16 @@
           <a:cs typeface="+mn-cs"/>
         </a:defRPr>
       </a:lvl8pPr>
-      <a:lvl9pPr marL="3886200" indent="-228600" algn="l" defTabSz="914400" rtl="0" eaLnBrk="1" latinLnBrk="0" hangingPunct="1">
+      <a:lvl9pPr marL="1512120" indent="-88948" algn="l" defTabSz="355793" rtl="0" eaLnBrk="1" latinLnBrk="0" hangingPunct="1">
         <a:lnSpc>
           <a:spcPct val="90000"/>
         </a:lnSpc>
         <a:spcBef>
-          <a:spcPts val="500"/>
+          <a:spcPts val="195"/>
         </a:spcBef>
         <a:buFont typeface="Arial" panose="020B0604020202020204" pitchFamily="34" charset="0"/>
         <a:buChar char="•"/>
-        <a:defRPr sz="1800" kern="1200">
+        <a:defRPr sz="700" kern="1200">
           <a:solidFill>
             <a:schemeClr val="tx1"/>
           </a:solidFill>
@@ -3232,10 +2872,10 @@
     </p:bodyStyle>
     <p:otherStyle>
       <a:defPPr>
-        <a:defRPr lang="nl-BE"/>
+        <a:defRPr lang="en-US"/>
       </a:defPPr>
-      <a:lvl1pPr marL="0" algn="l" defTabSz="914400" rtl="0" eaLnBrk="1" latinLnBrk="0" hangingPunct="1">
-        <a:defRPr sz="1800" kern="1200">
+      <a:lvl1pPr marL="0" algn="l" defTabSz="355793" rtl="0" eaLnBrk="1" latinLnBrk="0" hangingPunct="1">
+        <a:defRPr sz="700" kern="1200">
           <a:solidFill>
             <a:schemeClr val="tx1"/>
           </a:solidFill>
@@ -3244,8 +2884,8 @@
           <a:cs typeface="+mn-cs"/>
         </a:defRPr>
       </a:lvl1pPr>
-      <a:lvl2pPr marL="457200" algn="l" defTabSz="914400" rtl="0" eaLnBrk="1" latinLnBrk="0" hangingPunct="1">
-        <a:defRPr sz="1800" kern="1200">
+      <a:lvl2pPr marL="177897" algn="l" defTabSz="355793" rtl="0" eaLnBrk="1" latinLnBrk="0" hangingPunct="1">
+        <a:defRPr sz="700" kern="1200">
           <a:solidFill>
             <a:schemeClr val="tx1"/>
           </a:solidFill>
@@ -3254,8 +2894,8 @@
           <a:cs typeface="+mn-cs"/>
         </a:defRPr>
       </a:lvl2pPr>
-      <a:lvl3pPr marL="914400" algn="l" defTabSz="914400" rtl="0" eaLnBrk="1" latinLnBrk="0" hangingPunct="1">
-        <a:defRPr sz="1800" kern="1200">
+      <a:lvl3pPr marL="355793" algn="l" defTabSz="355793" rtl="0" eaLnBrk="1" latinLnBrk="0" hangingPunct="1">
+        <a:defRPr sz="700" kern="1200">
           <a:solidFill>
             <a:schemeClr val="tx1"/>
           </a:solidFill>
@@ -3264,8 +2904,8 @@
           <a:cs typeface="+mn-cs"/>
         </a:defRPr>
       </a:lvl3pPr>
-      <a:lvl4pPr marL="1371600" algn="l" defTabSz="914400" rtl="0" eaLnBrk="1" latinLnBrk="0" hangingPunct="1">
-        <a:defRPr sz="1800" kern="1200">
+      <a:lvl4pPr marL="533690" algn="l" defTabSz="355793" rtl="0" eaLnBrk="1" latinLnBrk="0" hangingPunct="1">
+        <a:defRPr sz="700" kern="1200">
           <a:solidFill>
             <a:schemeClr val="tx1"/>
           </a:solidFill>
@@ -3274,8 +2914,8 @@
           <a:cs typeface="+mn-cs"/>
         </a:defRPr>
       </a:lvl4pPr>
-      <a:lvl5pPr marL="1828800" algn="l" defTabSz="914400" rtl="0" eaLnBrk="1" latinLnBrk="0" hangingPunct="1">
-        <a:defRPr sz="1800" kern="1200">
+      <a:lvl5pPr marL="711586" algn="l" defTabSz="355793" rtl="0" eaLnBrk="1" latinLnBrk="0" hangingPunct="1">
+        <a:defRPr sz="700" kern="1200">
           <a:solidFill>
             <a:schemeClr val="tx1"/>
           </a:solidFill>
@@ -3284,8 +2924,8 @@
           <a:cs typeface="+mn-cs"/>
         </a:defRPr>
       </a:lvl5pPr>
-      <a:lvl6pPr marL="2286000" algn="l" defTabSz="914400" rtl="0" eaLnBrk="1" latinLnBrk="0" hangingPunct="1">
-        <a:defRPr sz="1800" kern="1200">
+      <a:lvl6pPr marL="889483" algn="l" defTabSz="355793" rtl="0" eaLnBrk="1" latinLnBrk="0" hangingPunct="1">
+        <a:defRPr sz="700" kern="1200">
           <a:solidFill>
             <a:schemeClr val="tx1"/>
           </a:solidFill>
@@ -3294,8 +2934,8 @@
           <a:cs typeface="+mn-cs"/>
         </a:defRPr>
       </a:lvl6pPr>
-      <a:lvl7pPr marL="2743200" algn="l" defTabSz="914400" rtl="0" eaLnBrk="1" latinLnBrk="0" hangingPunct="1">
-        <a:defRPr sz="1800" kern="1200">
+      <a:lvl7pPr marL="1067379" algn="l" defTabSz="355793" rtl="0" eaLnBrk="1" latinLnBrk="0" hangingPunct="1">
+        <a:defRPr sz="700" kern="1200">
           <a:solidFill>
             <a:schemeClr val="tx1"/>
           </a:solidFill>
@@ -3304,8 +2944,8 @@
           <a:cs typeface="+mn-cs"/>
         </a:defRPr>
       </a:lvl7pPr>
-      <a:lvl8pPr marL="3200400" algn="l" defTabSz="914400" rtl="0" eaLnBrk="1" latinLnBrk="0" hangingPunct="1">
-        <a:defRPr sz="1800" kern="1200">
+      <a:lvl8pPr marL="1245276" algn="l" defTabSz="355793" rtl="0" eaLnBrk="1" latinLnBrk="0" hangingPunct="1">
+        <a:defRPr sz="700" kern="1200">
           <a:solidFill>
             <a:schemeClr val="tx1"/>
           </a:solidFill>
@@ -3314,8 +2954,8 @@
           <a:cs typeface="+mn-cs"/>
         </a:defRPr>
       </a:lvl8pPr>
-      <a:lvl9pPr marL="3657600" algn="l" defTabSz="914400" rtl="0" eaLnBrk="1" latinLnBrk="0" hangingPunct="1">
-        <a:defRPr sz="1800" kern="1200">
+      <a:lvl9pPr marL="1423172" algn="l" defTabSz="355793" rtl="0" eaLnBrk="1" latinLnBrk="0" hangingPunct="1">
+        <a:defRPr sz="700" kern="1200">
           <a:solidFill>
             <a:schemeClr val="tx1"/>
           </a:solidFill>
@@ -3418,7 +3058,7 @@
         </p:blipFill>
         <p:spPr>
           <a:xfrm>
-            <a:off x="4318000" y="2095500"/>
+            <a:off x="794" y="2381"/>
             <a:ext cx="3556000" cy="2667000"/>
           </a:xfrm>
           <a:prstGeom prst="rect">
@@ -3426,6 +3066,235 @@
           </a:prstGeom>
         </p:spPr>
       </p:pic>
+      <p:cxnSp>
+        <p:nvCxnSpPr>
+          <p:cNvPr id="15" name="Rechte verbindingslijn met pijl 14">
+            <a:extLst>
+              <a:ext uri="{FF2B5EF4-FFF2-40B4-BE49-F238E27FC236}">
+                <a16:creationId xmlns:a16="http://schemas.microsoft.com/office/drawing/2014/main" id="{9A177E77-11D3-40B8-F669-FF932A868E87}"/>
+              </a:ext>
+            </a:extLst>
+          </p:cNvPr>
+          <p:cNvCxnSpPr>
+            <a:cxnSpLocks/>
+          </p:cNvCxnSpPr>
+          <p:nvPr/>
+        </p:nvCxnSpPr>
+        <p:spPr>
+          <a:xfrm flipV="1">
+            <a:off x="739775" y="419272"/>
+            <a:ext cx="0" cy="112367"/>
+          </a:xfrm>
+          <a:prstGeom prst="straightConnector1">
+            <a:avLst/>
+          </a:prstGeom>
+          <a:ln w="9525" cap="flat" cmpd="sng" algn="ctr">
+            <a:solidFill>
+              <a:schemeClr val="accent6"/>
+            </a:solidFill>
+            <a:prstDash val="solid"/>
+            <a:round/>
+            <a:headEnd type="arrow" w="med" len="med"/>
+            <a:tailEnd type="arrow" w="med" len="med"/>
+          </a:ln>
+        </p:spPr>
+        <p:style>
+          <a:lnRef idx="0">
+            <a:scrgbClr r="0" g="0" b="0"/>
+          </a:lnRef>
+          <a:fillRef idx="0">
+            <a:scrgbClr r="0" g="0" b="0"/>
+          </a:fillRef>
+          <a:effectRef idx="0">
+            <a:scrgbClr r="0" g="0" b="0"/>
+          </a:effectRef>
+          <a:fontRef idx="minor">
+            <a:schemeClr val="tx1"/>
+          </a:fontRef>
+        </p:style>
+      </p:cxnSp>
+      <p:cxnSp>
+        <p:nvCxnSpPr>
+          <p:cNvPr id="19" name="Rechte verbindingslijn met pijl 18">
+            <a:extLst>
+              <a:ext uri="{FF2B5EF4-FFF2-40B4-BE49-F238E27FC236}">
+                <a16:creationId xmlns:a16="http://schemas.microsoft.com/office/drawing/2014/main" id="{13551773-4B9D-95B6-BF1B-DC570E94A17D}"/>
+              </a:ext>
+            </a:extLst>
+          </p:cNvPr>
+          <p:cNvCxnSpPr>
+            <a:cxnSpLocks/>
+          </p:cNvCxnSpPr>
+          <p:nvPr/>
+        </p:nvCxnSpPr>
+        <p:spPr>
+          <a:xfrm>
+            <a:off x="3219450" y="371475"/>
+            <a:ext cx="0" cy="337446"/>
+          </a:xfrm>
+          <a:prstGeom prst="straightConnector1">
+            <a:avLst/>
+          </a:prstGeom>
+          <a:ln w="9525" cap="flat" cmpd="sng" algn="ctr">
+            <a:solidFill>
+              <a:schemeClr val="accent6"/>
+            </a:solidFill>
+            <a:prstDash val="solid"/>
+            <a:round/>
+            <a:headEnd type="arrow" w="med" len="med"/>
+            <a:tailEnd type="arrow" w="med" len="med"/>
+          </a:ln>
+        </p:spPr>
+        <p:style>
+          <a:lnRef idx="0">
+            <a:scrgbClr r="0" g="0" b="0"/>
+          </a:lnRef>
+          <a:fillRef idx="0">
+            <a:scrgbClr r="0" g="0" b="0"/>
+          </a:fillRef>
+          <a:effectRef idx="0">
+            <a:scrgbClr r="0" g="0" b="0"/>
+          </a:effectRef>
+          <a:fontRef idx="minor">
+            <a:schemeClr val="tx1"/>
+          </a:fontRef>
+        </p:style>
+      </p:cxnSp>
+      <p:cxnSp>
+        <p:nvCxnSpPr>
+          <p:cNvPr id="27" name="Rechte verbindingslijn 26">
+            <a:extLst>
+              <a:ext uri="{FF2B5EF4-FFF2-40B4-BE49-F238E27FC236}">
+                <a16:creationId xmlns:a16="http://schemas.microsoft.com/office/drawing/2014/main" id="{1E15476E-1CD9-C4A3-DB5F-FF94BBCC0262}"/>
+              </a:ext>
+            </a:extLst>
+          </p:cNvPr>
+          <p:cNvCxnSpPr>
+            <a:cxnSpLocks/>
+          </p:cNvCxnSpPr>
+          <p:nvPr/>
+        </p:nvCxnSpPr>
+        <p:spPr>
+          <a:xfrm>
+            <a:off x="460574" y="579437"/>
+            <a:ext cx="2762949" cy="0"/>
+          </a:xfrm>
+          <a:prstGeom prst="line">
+            <a:avLst/>
+          </a:prstGeom>
+          <a:ln>
+            <a:solidFill>
+              <a:srgbClr val="92D050"/>
+            </a:solidFill>
+            <a:prstDash val="dash"/>
+          </a:ln>
+        </p:spPr>
+        <p:style>
+          <a:lnRef idx="1">
+            <a:schemeClr val="accent1"/>
+          </a:lnRef>
+          <a:fillRef idx="0">
+            <a:schemeClr val="accent1"/>
+          </a:fillRef>
+          <a:effectRef idx="0">
+            <a:schemeClr val="accent1"/>
+          </a:effectRef>
+          <a:fontRef idx="minor">
+            <a:schemeClr val="tx1"/>
+          </a:fontRef>
+        </p:style>
+      </p:cxnSp>
+      <p:cxnSp>
+        <p:nvCxnSpPr>
+          <p:cNvPr id="29" name="Rechte verbindingslijn met pijl 28">
+            <a:extLst>
+              <a:ext uri="{FF2B5EF4-FFF2-40B4-BE49-F238E27FC236}">
+                <a16:creationId xmlns:a16="http://schemas.microsoft.com/office/drawing/2014/main" id="{4E6CDB30-D540-FF13-A868-2DCA93CEC207}"/>
+              </a:ext>
+            </a:extLst>
+          </p:cNvPr>
+          <p:cNvCxnSpPr>
+            <a:cxnSpLocks/>
+          </p:cNvCxnSpPr>
+          <p:nvPr/>
+        </p:nvCxnSpPr>
+        <p:spPr>
+          <a:xfrm>
+            <a:off x="460574" y="374650"/>
+            <a:ext cx="0" cy="201612"/>
+          </a:xfrm>
+          <a:prstGeom prst="straightConnector1">
+            <a:avLst/>
+          </a:prstGeom>
+          <a:ln w="9525" cap="flat" cmpd="sng" algn="ctr">
+            <a:solidFill>
+              <a:schemeClr val="accent6"/>
+            </a:solidFill>
+            <a:prstDash val="solid"/>
+            <a:round/>
+            <a:headEnd type="arrow" w="med" len="med"/>
+            <a:tailEnd type="arrow" w="med" len="med"/>
+          </a:ln>
+        </p:spPr>
+        <p:style>
+          <a:lnRef idx="0">
+            <a:scrgbClr r="0" g="0" b="0"/>
+          </a:lnRef>
+          <a:fillRef idx="0">
+            <a:scrgbClr r="0" g="0" b="0"/>
+          </a:fillRef>
+          <a:effectRef idx="0">
+            <a:scrgbClr r="0" g="0" b="0"/>
+          </a:effectRef>
+          <a:fontRef idx="minor">
+            <a:schemeClr val="tx1"/>
+          </a:fontRef>
+        </p:style>
+      </p:cxnSp>
+      <p:cxnSp>
+        <p:nvCxnSpPr>
+          <p:cNvPr id="31" name="Rechte verbindingslijn 30">
+            <a:extLst>
+              <a:ext uri="{FF2B5EF4-FFF2-40B4-BE49-F238E27FC236}">
+                <a16:creationId xmlns:a16="http://schemas.microsoft.com/office/drawing/2014/main" id="{42C94439-E7A0-997D-D69D-0C01B7CB8E0F}"/>
+              </a:ext>
+            </a:extLst>
+          </p:cNvPr>
+          <p:cNvCxnSpPr>
+            <a:cxnSpLocks/>
+          </p:cNvCxnSpPr>
+          <p:nvPr/>
+        </p:nvCxnSpPr>
+        <p:spPr>
+          <a:xfrm>
+            <a:off x="460574" y="371475"/>
+            <a:ext cx="2762949" cy="0"/>
+          </a:xfrm>
+          <a:prstGeom prst="line">
+            <a:avLst/>
+          </a:prstGeom>
+          <a:ln>
+            <a:solidFill>
+              <a:srgbClr val="92D050"/>
+            </a:solidFill>
+            <a:prstDash val="dash"/>
+          </a:ln>
+        </p:spPr>
+        <p:style>
+          <a:lnRef idx="1">
+            <a:schemeClr val="accent1"/>
+          </a:lnRef>
+          <a:fillRef idx="0">
+            <a:schemeClr val="accent1"/>
+          </a:fillRef>
+          <a:effectRef idx="0">
+            <a:schemeClr val="accent1"/>
+          </a:effectRef>
+          <a:fontRef idx="minor">
+            <a:schemeClr val="tx1"/>
+          </a:fontRef>
+        </p:style>
+      </p:cxnSp>
     </p:spTree>
     <p:extLst>
       <p:ext uri="{BB962C8B-B14F-4D97-AF65-F5344CB8AC3E}">
@@ -3528,7 +3397,7 @@
         </p:blipFill>
         <p:spPr>
           <a:xfrm>
-            <a:off x="4318000" y="2095500"/>
+            <a:off x="794" y="2381"/>
             <a:ext cx="3556000" cy="2667000"/>
           </a:xfrm>
           <a:prstGeom prst="rect">
@@ -3638,7 +3507,7 @@
         </p:blipFill>
         <p:spPr>
           <a:xfrm>
-            <a:off x="4618000" y="2395500"/>
+            <a:off x="794" y="2381"/>
             <a:ext cx="3556000" cy="2667000"/>
           </a:xfrm>
           <a:prstGeom prst="rect">
@@ -3748,7 +3617,7 @@
         </p:blipFill>
         <p:spPr>
           <a:xfrm>
-            <a:off x="4768000" y="2545500"/>
+            <a:off x="794" y="2381"/>
             <a:ext cx="3556000" cy="2667000"/>
           </a:xfrm>
           <a:prstGeom prst="rect">
@@ -3858,7 +3727,7 @@
         </p:blipFill>
         <p:spPr>
           <a:xfrm>
-            <a:off x="496000" y="2095500"/>
+            <a:off x="794" y="2381"/>
             <a:ext cx="3556000" cy="2667000"/>
           </a:xfrm>
           <a:prstGeom prst="rect">
@@ -3882,7 +3751,7 @@
 <file path=ppt/theme/theme1.xml><?xml version="1.0" encoding="utf-8"?>
 <a:theme xmlns:a="http://schemas.openxmlformats.org/drawingml/2006/main" name="Kantoorthema">
   <a:themeElements>
-    <a:clrScheme name="Office">
+    <a:clrScheme name="Kantoorthema">
       <a:dk1>
         <a:sysClr val="windowText" lastClr="000000"/>
       </a:dk1>
@@ -3920,7 +3789,7 @@
         <a:srgbClr val="954F72"/>
       </a:folHlink>
     </a:clrScheme>
-    <a:fontScheme name="Office">
+    <a:fontScheme name="Kantoorthema">
       <a:majorFont>
         <a:latin typeface="Calibri Light" panose="020F0302020204030204"/>
         <a:ea typeface=""/>
@@ -3955,23 +3824,6 @@
         <a:font script="Viet" typeface="Times New Roman"/>
         <a:font script="Uigh" typeface="Microsoft Uighur"/>
         <a:font script="Geor" typeface="Sylfaen"/>
-        <a:font script="Armn" typeface="Arial"/>
-        <a:font script="Bugi" typeface="Leelawadee UI"/>
-        <a:font script="Bopo" typeface="Microsoft JhengHei"/>
-        <a:font script="Java" typeface="Javanese Text"/>
-        <a:font script="Lisu" typeface="Segoe UI"/>
-        <a:font script="Mymr" typeface="Myanmar Text"/>
-        <a:font script="Nkoo" typeface="Ebrima"/>
-        <a:font script="Olck" typeface="Nirmala UI"/>
-        <a:font script="Osma" typeface="Ebrima"/>
-        <a:font script="Phag" typeface="Phagspa"/>
-        <a:font script="Syrn" typeface="Estrangelo Edessa"/>
-        <a:font script="Syrj" typeface="Estrangelo Edessa"/>
-        <a:font script="Syre" typeface="Estrangelo Edessa"/>
-        <a:font script="Sora" typeface="Nirmala UI"/>
-        <a:font script="Tale" typeface="Microsoft Tai Le"/>
-        <a:font script="Talu" typeface="Microsoft New Tai Lue"/>
-        <a:font script="Tfng" typeface="Ebrima"/>
       </a:majorFont>
       <a:minorFont>
         <a:latin typeface="Calibri" panose="020F0502020204030204"/>
@@ -4007,26 +3859,9 @@
         <a:font script="Viet" typeface="Arial"/>
         <a:font script="Uigh" typeface="Microsoft Uighur"/>
         <a:font script="Geor" typeface="Sylfaen"/>
-        <a:font script="Armn" typeface="Arial"/>
-        <a:font script="Bugi" typeface="Leelawadee UI"/>
-        <a:font script="Bopo" typeface="Microsoft JhengHei"/>
-        <a:font script="Java" typeface="Javanese Text"/>
-        <a:font script="Lisu" typeface="Segoe UI"/>
-        <a:font script="Mymr" typeface="Myanmar Text"/>
-        <a:font script="Nkoo" typeface="Ebrima"/>
-        <a:font script="Olck" typeface="Nirmala UI"/>
-        <a:font script="Osma" typeface="Ebrima"/>
-        <a:font script="Phag" typeface="Phagspa"/>
-        <a:font script="Syrn" typeface="Estrangelo Edessa"/>
-        <a:font script="Syrj" typeface="Estrangelo Edessa"/>
-        <a:font script="Syre" typeface="Estrangelo Edessa"/>
-        <a:font script="Sora" typeface="Nirmala UI"/>
-        <a:font script="Tale" typeface="Microsoft Tai Le"/>
-        <a:font script="Talu" typeface="Microsoft New Tai Lue"/>
-        <a:font script="Tfng" typeface="Ebrima"/>
       </a:minorFont>
     </a:fontScheme>
-    <a:fmtScheme name="Office">
+    <a:fmtScheme name="Kantoorthema">
       <a:fillStyleLst>
         <a:solidFill>
           <a:schemeClr val="phClr"/>
@@ -4168,7 +4003,7 @@
   <a:extraClrSchemeLst/>
   <a:extLst>
     <a:ext uri="{05A4C25C-085E-4340-85A3-A5531E510DB2}">
-      <thm15:themeFamily xmlns:thm15="http://schemas.microsoft.com/office/thememl/2012/main" name="Office Theme" id="{62F939B6-93AF-4DB8-9C6B-D6C7DFDC589F}" vid="{4A3C46E8-61CC-4603-A589-7422A47A8E4A}"/>
+      <thm15:themeFamily xmlns:thm15="http://schemas.microsoft.com/office/thememl/2012/main" name="Office Theme 2013 - 2022" id="{62F939B6-93AF-4DB8-9C6B-D6C7DFDC589F}" vid="{4A3C46E8-61CC-4603-A589-7422A47A8E4A}"/>
     </a:ext>
   </a:extLst>
 </a:theme>

</xml_diff>